<commit_message>
Fixed fractions, added VS download link
</commit_message>
<xml_diff>
--- a/NUGameDev/UnityIntro.pptx
+++ b/NUGameDev/UnityIntro.pptx
@@ -216,6 +216,9 @@
         </p14:section>
       </p14:sectionLst>
     </p:ext>
+    <p:ext uri="{EFAFB233-063F-42B5-8137-9DF3F51BA10A}">
+      <p15:sldGuideLst xmlns:p15="http://schemas.microsoft.com/office/powerpoint/2012/main"/>
+    </p:ext>
   </p:extLst>
 </p:presentation>
 </file>
@@ -369,7 +372,7 @@
           <a:p>
             <a:fld id="{17CAAE78-7B8D-48EA-A6F8-033DA94F316B}" type="datetimeFigureOut">
               <a:rPr lang="en-GB" smtClean="0"/>
-              <a:t>08/10/2019</a:t>
+              <a:t>20/12/2019</a:t>
             </a:fld>
             <a:endParaRPr lang="en-GB"/>
           </a:p>
@@ -569,7 +572,7 @@
           <a:p>
             <a:fld id="{17CAAE78-7B8D-48EA-A6F8-033DA94F316B}" type="datetimeFigureOut">
               <a:rPr lang="en-GB" smtClean="0"/>
-              <a:t>08/10/2019</a:t>
+              <a:t>20/12/2019</a:t>
             </a:fld>
             <a:endParaRPr lang="en-GB"/>
           </a:p>
@@ -779,7 +782,7 @@
           <a:p>
             <a:fld id="{17CAAE78-7B8D-48EA-A6F8-033DA94F316B}" type="datetimeFigureOut">
               <a:rPr lang="en-GB" smtClean="0"/>
-              <a:t>08/10/2019</a:t>
+              <a:t>20/12/2019</a:t>
             </a:fld>
             <a:endParaRPr lang="en-GB"/>
           </a:p>
@@ -979,7 +982,7 @@
           <a:p>
             <a:fld id="{17CAAE78-7B8D-48EA-A6F8-033DA94F316B}" type="datetimeFigureOut">
               <a:rPr lang="en-GB" smtClean="0"/>
-              <a:t>08/10/2019</a:t>
+              <a:t>20/12/2019</a:t>
             </a:fld>
             <a:endParaRPr lang="en-GB"/>
           </a:p>
@@ -1255,7 +1258,7 @@
           <a:p>
             <a:fld id="{17CAAE78-7B8D-48EA-A6F8-033DA94F316B}" type="datetimeFigureOut">
               <a:rPr lang="en-GB" smtClean="0"/>
-              <a:t>08/10/2019</a:t>
+              <a:t>20/12/2019</a:t>
             </a:fld>
             <a:endParaRPr lang="en-GB"/>
           </a:p>
@@ -1523,7 +1526,7 @@
           <a:p>
             <a:fld id="{17CAAE78-7B8D-48EA-A6F8-033DA94F316B}" type="datetimeFigureOut">
               <a:rPr lang="en-GB" smtClean="0"/>
-              <a:t>08/10/2019</a:t>
+              <a:t>20/12/2019</a:t>
             </a:fld>
             <a:endParaRPr lang="en-GB"/>
           </a:p>
@@ -1938,7 +1941,7 @@
           <a:p>
             <a:fld id="{17CAAE78-7B8D-48EA-A6F8-033DA94F316B}" type="datetimeFigureOut">
               <a:rPr lang="en-GB" smtClean="0"/>
-              <a:t>08/10/2019</a:t>
+              <a:t>20/12/2019</a:t>
             </a:fld>
             <a:endParaRPr lang="en-GB"/>
           </a:p>
@@ -2080,7 +2083,7 @@
           <a:p>
             <a:fld id="{17CAAE78-7B8D-48EA-A6F8-033DA94F316B}" type="datetimeFigureOut">
               <a:rPr lang="en-GB" smtClean="0"/>
-              <a:t>08/10/2019</a:t>
+              <a:t>20/12/2019</a:t>
             </a:fld>
             <a:endParaRPr lang="en-GB"/>
           </a:p>
@@ -2193,7 +2196,7 @@
           <a:p>
             <a:fld id="{17CAAE78-7B8D-48EA-A6F8-033DA94F316B}" type="datetimeFigureOut">
               <a:rPr lang="en-GB" smtClean="0"/>
-              <a:t>08/10/2019</a:t>
+              <a:t>20/12/2019</a:t>
             </a:fld>
             <a:endParaRPr lang="en-GB"/>
           </a:p>
@@ -2506,7 +2509,7 @@
           <a:p>
             <a:fld id="{17CAAE78-7B8D-48EA-A6F8-033DA94F316B}" type="datetimeFigureOut">
               <a:rPr lang="en-GB" smtClean="0"/>
-              <a:t>08/10/2019</a:t>
+              <a:t>20/12/2019</a:t>
             </a:fld>
             <a:endParaRPr lang="en-GB"/>
           </a:p>
@@ -2795,7 +2798,7 @@
           <a:p>
             <a:fld id="{17CAAE78-7B8D-48EA-A6F8-033DA94F316B}" type="datetimeFigureOut">
               <a:rPr lang="en-GB" smtClean="0"/>
-              <a:t>08/10/2019</a:t>
+              <a:t>20/12/2019</a:t>
             </a:fld>
             <a:endParaRPr lang="en-GB"/>
           </a:p>
@@ -3038,7 +3041,7 @@
           <a:p>
             <a:fld id="{17CAAE78-7B8D-48EA-A6F8-033DA94F316B}" type="datetimeFigureOut">
               <a:rPr lang="en-GB" smtClean="0"/>
-              <a:t>08/10/2019</a:t>
+              <a:t>20/12/2019</a:t>
             </a:fld>
             <a:endParaRPr lang="en-GB"/>
           </a:p>
@@ -3753,7 +3756,7 @@
           <p:nvPr/>
         </p:nvPicPr>
         <p:blipFill>
-          <a:blip r:embed="rId2">
+          <a:blip r:embed="rId2" cstate="hqprint">
             <a:extLst>
               <a:ext uri="{28A0092B-C50C-407E-A947-70E740481C1C}">
                 <a14:useLocalDpi xmlns:a14="http://schemas.microsoft.com/office/drawing/2010/main" val="0"/>
@@ -4508,7 +4511,7 @@
           <p:nvPr/>
         </p:nvPicPr>
         <p:blipFill>
-          <a:blip r:embed="rId2">
+          <a:blip r:embed="rId2" cstate="hqprint">
             <a:extLst>
               <a:ext uri="{28A0092B-C50C-407E-A947-70E740481C1C}">
                 <a14:useLocalDpi xmlns:a14="http://schemas.microsoft.com/office/drawing/2010/main" val="0"/>
@@ -5126,6 +5129,12 @@
             <a:pPr marL="0" indent="0" algn="ctr">
               <a:buNone/>
             </a:pPr>
+            <a:r>
+              <a:rPr lang="en-GB" sz="1800" dirty="0">
+                <a:latin typeface="Bahnschrift" panose="020B0502040204020203" pitchFamily="34" charset="0"/>
+              </a:rPr>
+              <a:t/>
+            </a:r>
             <a:br>
               <a:rPr lang="en-GB" sz="1800" dirty="0">
                 <a:latin typeface="Bahnschrift" panose="020B0502040204020203" pitchFamily="34" charset="0"/>
@@ -5135,8 +5144,36 @@
               <a:rPr lang="en-GB" sz="1200" i="1" dirty="0">
                 <a:latin typeface="Bahnschrift" panose="020B0502040204020203" pitchFamily="34" charset="0"/>
               </a:rPr>
-              <a:t>*If you don’t have Visual Studio installed, go do that</a:t>
-            </a:r>
+              <a:t>*If you don’t have Visual Studio installed, go do </a:t>
+            </a:r>
+            <a:r>
+              <a:rPr lang="en-GB" sz="1200" i="1" dirty="0" smtClean="0">
+                <a:latin typeface="Bahnschrift" panose="020B0502040204020203" pitchFamily="34" charset="0"/>
+              </a:rPr>
+              <a:t>that</a:t>
+            </a:r>
+            <a:br>
+              <a:rPr lang="en-GB" sz="1200" i="1" dirty="0" smtClean="0">
+                <a:latin typeface="Bahnschrift" panose="020B0502040204020203" pitchFamily="34" charset="0"/>
+              </a:rPr>
+            </a:br>
+            <a:r>
+              <a:rPr lang="en-GB" sz="1200" i="1" dirty="0" smtClean="0">
+                <a:latin typeface="Bahnschrift" panose="020B0502040204020203" pitchFamily="34" charset="0"/>
+                <a:hlinkClick r:id="rId2"/>
+              </a:rPr>
+              <a:t>https</a:t>
+            </a:r>
+            <a:r>
+              <a:rPr lang="en-GB" sz="1200" i="1" dirty="0">
+                <a:latin typeface="Bahnschrift" panose="020B0502040204020203" pitchFamily="34" charset="0"/>
+                <a:hlinkClick r:id="rId2"/>
+              </a:rPr>
+              <a:t>://visualstudio.microsoft.com/downloads/</a:t>
+            </a:r>
+            <a:endParaRPr lang="en-GB" sz="1200" i="1" dirty="0">
+              <a:latin typeface="Bahnschrift" panose="020B0502040204020203" pitchFamily="34" charset="0"/>
+            </a:endParaRPr>
           </a:p>
           <a:p>
             <a:endParaRPr lang="en-GB" sz="1800" dirty="0">
@@ -5165,7 +5202,7 @@
           <p:nvPr/>
         </p:nvPicPr>
         <p:blipFill>
-          <a:blip r:embed="rId2">
+          <a:blip r:embed="rId3" cstate="hqprint">
             <a:extLst>
               <a:ext uri="{28A0092B-C50C-407E-A947-70E740481C1C}">
                 <a14:useLocalDpi xmlns:a14="http://schemas.microsoft.com/office/drawing/2010/main" val="0"/>
@@ -5580,7 +5617,7 @@
           <p:nvPr/>
         </p:nvPicPr>
         <p:blipFill>
-          <a:blip r:embed="rId3"/>
+          <a:blip r:embed="rId4"/>
           <a:stretch>
             <a:fillRect/>
           </a:stretch>
@@ -5849,7 +5886,7 @@
           <p:nvPr/>
         </p:nvPicPr>
         <p:blipFill>
-          <a:blip r:embed="rId2">
+          <a:blip r:embed="rId2" cstate="hqprint">
             <a:extLst>
               <a:ext uri="{28A0092B-C50C-407E-A947-70E740481C1C}">
                 <a14:useLocalDpi xmlns:a14="http://schemas.microsoft.com/office/drawing/2010/main" val="0"/>
@@ -6575,7 +6612,7 @@
           <p:nvPr/>
         </p:nvPicPr>
         <p:blipFill>
-          <a:blip r:embed="rId2">
+          <a:blip r:embed="rId2" cstate="hqprint">
             <a:extLst>
               <a:ext uri="{28A0092B-C50C-407E-A947-70E740481C1C}">
                 <a14:useLocalDpi xmlns:a14="http://schemas.microsoft.com/office/drawing/2010/main" val="0"/>
@@ -7279,7 +7316,7 @@
           <p:nvPr/>
         </p:nvPicPr>
         <p:blipFill>
-          <a:blip r:embed="rId2">
+          <a:blip r:embed="rId2" cstate="hqprint">
             <a:extLst>
               <a:ext uri="{28A0092B-C50C-407E-A947-70E740481C1C}">
                 <a14:useLocalDpi xmlns:a14="http://schemas.microsoft.com/office/drawing/2010/main" val="0"/>
@@ -7952,7 +7989,7 @@
           <p:nvPr/>
         </p:nvPicPr>
         <p:blipFill>
-          <a:blip r:embed="rId2">
+          <a:blip r:embed="rId2" cstate="hqprint">
             <a:extLst>
               <a:ext uri="{28A0092B-C50C-407E-A947-70E740481C1C}">
                 <a14:useLocalDpi xmlns:a14="http://schemas.microsoft.com/office/drawing/2010/main" val="0"/>
@@ -8600,7 +8637,7 @@
           <p:nvPr/>
         </p:nvPicPr>
         <p:blipFill>
-          <a:blip r:embed="rId2">
+          <a:blip r:embed="rId2" cstate="hqprint">
             <a:extLst>
               <a:ext uri="{28A0092B-C50C-407E-A947-70E740481C1C}">
                 <a14:useLocalDpi xmlns:a14="http://schemas.microsoft.com/office/drawing/2010/main" val="0"/>
@@ -9311,7 +9348,7 @@
           <p:nvPr/>
         </p:nvPicPr>
         <p:blipFill>
-          <a:blip r:embed="rId2">
+          <a:blip r:embed="rId2" cstate="hqprint">
             <a:extLst>
               <a:ext uri="{28A0092B-C50C-407E-A947-70E740481C1C}">
                 <a14:useLocalDpi xmlns:a14="http://schemas.microsoft.com/office/drawing/2010/main" val="0"/>
@@ -10022,7 +10059,7 @@
           <p:nvPr/>
         </p:nvPicPr>
         <p:blipFill>
-          <a:blip r:embed="rId2">
+          <a:blip r:embed="rId2" cstate="hqprint">
             <a:extLst>
               <a:ext uri="{28A0092B-C50C-407E-A947-70E740481C1C}">
                 <a14:useLocalDpi xmlns:a14="http://schemas.microsoft.com/office/drawing/2010/main" val="0"/>
@@ -10648,7 +10685,7 @@
                 <a:hlinkClick r:id="rId2">
                   <a:extLst>
                     <a:ext uri="{A12FA001-AC4F-418D-AE19-62706E023703}">
-                      <ahyp:hlinkClr xmlns:ahyp="http://schemas.microsoft.com/office/drawing/2018/hyperlinkcolor" val="tx"/>
+                      <ahyp:hlinkClr xmlns:ahyp="http://schemas.microsoft.com/office/drawing/2018/hyperlinkcolor" xmlns="" val="tx"/>
                     </a:ext>
                   </a:extLst>
                 </a:hlinkClick>
@@ -10673,7 +10710,7 @@
                 <a:hlinkClick r:id="rId3">
                   <a:extLst>
                     <a:ext uri="{A12FA001-AC4F-418D-AE19-62706E023703}">
-                      <ahyp:hlinkClr xmlns:ahyp="http://schemas.microsoft.com/office/drawing/2018/hyperlinkcolor" val="tx"/>
+                      <ahyp:hlinkClr xmlns:ahyp="http://schemas.microsoft.com/office/drawing/2018/hyperlinkcolor" xmlns="" val="tx"/>
                     </a:ext>
                   </a:extLst>
                 </a:hlinkClick>
@@ -10698,7 +10735,7 @@
                 <a:hlinkClick r:id="rId4">
                   <a:extLst>
                     <a:ext uri="{A12FA001-AC4F-418D-AE19-62706E023703}">
-                      <ahyp:hlinkClr xmlns:ahyp="http://schemas.microsoft.com/office/drawing/2018/hyperlinkcolor" val="tx"/>
+                      <ahyp:hlinkClr xmlns:ahyp="http://schemas.microsoft.com/office/drawing/2018/hyperlinkcolor" xmlns="" val="tx"/>
                     </a:ext>
                   </a:extLst>
                 </a:hlinkClick>
@@ -10714,7 +10751,7 @@
                 <a:hlinkClick r:id="rId4">
                   <a:extLst>
                     <a:ext uri="{A12FA001-AC4F-418D-AE19-62706E023703}">
-                      <ahyp:hlinkClr xmlns:ahyp="http://schemas.microsoft.com/office/drawing/2018/hyperlinkcolor" val="tx"/>
+                      <ahyp:hlinkClr xmlns:ahyp="http://schemas.microsoft.com/office/drawing/2018/hyperlinkcolor" xmlns="" val="tx"/>
                     </a:ext>
                   </a:extLst>
                 </a:hlinkClick>
@@ -10754,7 +10791,7 @@
           <p:nvPr/>
         </p:nvPicPr>
         <p:blipFill>
-          <a:blip r:embed="rId5">
+          <a:blip r:embed="rId5" cstate="hqprint">
             <a:extLst>
               <a:ext uri="{28A0092B-C50C-407E-A947-70E740481C1C}">
                 <a14:useLocalDpi xmlns:a14="http://schemas.microsoft.com/office/drawing/2010/main" val="0"/>
@@ -11299,7 +11336,7 @@
           <a:lstStyle/>
           <a:p>
             <a:r>
-              <a:rPr lang="en-GB" sz="1800" dirty="0" err="1">
+              <a:rPr lang="en-GB" sz="1800" dirty="0" smtClean="0">
                 <a:latin typeface="Bahnschrift" panose="020B0502040204020203" pitchFamily="34" charset="0"/>
               </a:rPr>
               <a:t>Time.deltaTime</a:t>
@@ -11308,14 +11345,35 @@
               <a:rPr lang="en-GB" sz="1800" dirty="0">
                 <a:latin typeface="Bahnschrift" panose="020B0502040204020203" pitchFamily="34" charset="0"/>
               </a:rPr>
-              <a:t> returns the amount of time since the last frame</a:t>
-            </a:r>
-          </a:p>
-          <a:p>
+              <a:t> returns the amount of </a:t>
+            </a:r>
+            <a:r>
+              <a:rPr lang="en-GB" sz="1800" dirty="0" smtClean="0">
+                <a:latin typeface="Bahnschrift" panose="020B0502040204020203" pitchFamily="34" charset="0"/>
+              </a:rPr>
+              <a:t>time </a:t>
+            </a:r>
             <a:r>
               <a:rPr lang="en-GB" sz="1800" dirty="0">
                 <a:latin typeface="Bahnschrift" panose="020B0502040204020203" pitchFamily="34" charset="0"/>
               </a:rPr>
+              <a:t>since the last </a:t>
+            </a:r>
+            <a:r>
+              <a:rPr lang="en-GB" sz="1800" dirty="0" smtClean="0">
+                <a:latin typeface="Bahnschrift" panose="020B0502040204020203" pitchFamily="34" charset="0"/>
+              </a:rPr>
+              <a:t>frame </a:t>
+            </a:r>
+            <a:endParaRPr lang="en-GB" sz="1800" dirty="0">
+              <a:latin typeface="Bahnschrift" panose="020B0502040204020203" pitchFamily="34" charset="0"/>
+            </a:endParaRPr>
+          </a:p>
+          <a:p>
+            <a:r>
+              <a:rPr lang="en-GB" sz="1800" dirty="0">
+                <a:latin typeface="Bahnschrift" panose="020B0502040204020203" pitchFamily="34" charset="0"/>
+              </a:rPr>
               <a:t>If we run at 60FPS</a:t>
             </a:r>
           </a:p>
@@ -11325,7 +11383,19 @@
               <a:rPr lang="en-GB" sz="1400" dirty="0">
                 <a:latin typeface="Bahnschrift" panose="020B0502040204020203" pitchFamily="34" charset="0"/>
               </a:rPr>
-              <a:t>Each frame is on screen for     seconds = 1 ÷ 60 = 0.016 (approx.)</a:t>
+              <a:t>Each frame is on screen for </a:t>
+            </a:r>
+            <a:r>
+              <a:rPr lang="en-GB" sz="1400" dirty="0" smtClean="0">
+                <a:latin typeface="Bahnschrift" panose="020B0502040204020203" pitchFamily="34" charset="0"/>
+              </a:rPr>
+              <a:t>      seconds </a:t>
+            </a:r>
+            <a:r>
+              <a:rPr lang="en-GB" sz="1400" dirty="0">
+                <a:latin typeface="Bahnschrift" panose="020B0502040204020203" pitchFamily="34" charset="0"/>
+              </a:rPr>
+              <a:t>= 1 ÷ 60 = 0.016 (approx.)</a:t>
             </a:r>
           </a:p>
           <a:p>
@@ -11342,7 +11412,19 @@
               <a:rPr lang="en-GB" sz="1400" dirty="0">
                 <a:latin typeface="Bahnschrift" panose="020B0502040204020203" pitchFamily="34" charset="0"/>
               </a:rPr>
-              <a:t>Each frame is on screen for     seconds = 1 ÷ 30 = 0.033 (approx.)</a:t>
+              <a:t>Each frame is on screen for    </a:t>
+            </a:r>
+            <a:r>
+              <a:rPr lang="en-GB" sz="1400" dirty="0" smtClean="0">
+                <a:latin typeface="Bahnschrift" panose="020B0502040204020203" pitchFamily="34" charset="0"/>
+              </a:rPr>
+              <a:t>   </a:t>
+            </a:r>
+            <a:r>
+              <a:rPr lang="en-GB" sz="1400" dirty="0">
+                <a:latin typeface="Bahnschrift" panose="020B0502040204020203" pitchFamily="34" charset="0"/>
+              </a:rPr>
+              <a:t>seconds = 1 ÷ 30 = 0.033 (approx.)</a:t>
             </a:r>
           </a:p>
           <a:p>
@@ -11500,7 +11582,7 @@
           <p:nvPr/>
         </p:nvPicPr>
         <p:blipFill>
-          <a:blip r:embed="rId2">
+          <a:blip r:embed="rId2" cstate="hqprint">
             <a:extLst>
               <a:ext uri="{28A0092B-C50C-407E-A947-70E740481C1C}">
                 <a14:useLocalDpi xmlns:a14="http://schemas.microsoft.com/office/drawing/2010/main" val="0"/>
@@ -11914,7 +11996,7 @@
         </p:nvGrpSpPr>
         <p:grpSpPr>
           <a:xfrm>
-            <a:off x="4026715" y="2874277"/>
+            <a:off x="3932119" y="2882160"/>
             <a:ext cx="436228" cy="589327"/>
             <a:chOff x="4085438" y="3134336"/>
             <a:chExt cx="436228" cy="589327"/>
@@ -12193,7 +12275,7 @@
         </p:nvGrpSpPr>
         <p:grpSpPr>
           <a:xfrm>
-            <a:off x="4026715" y="3493986"/>
+            <a:off x="3932121" y="3501869"/>
             <a:ext cx="436228" cy="589327"/>
             <a:chOff x="4085438" y="3134336"/>
             <a:chExt cx="436228" cy="589327"/>
@@ -12732,7 +12814,7 @@
           <p:nvPr/>
         </p:nvPicPr>
         <p:blipFill>
-          <a:blip r:embed="rId2">
+          <a:blip r:embed="rId2" cstate="hqprint">
             <a:extLst>
               <a:ext uri="{28A0092B-C50C-407E-A947-70E740481C1C}">
                 <a14:useLocalDpi xmlns:a14="http://schemas.microsoft.com/office/drawing/2010/main" val="0"/>
@@ -13406,7 +13488,7 @@
           <p:nvPr/>
         </p:nvPicPr>
         <p:blipFill>
-          <a:blip r:embed="rId2">
+          <a:blip r:embed="rId2" cstate="hqprint">
             <a:extLst>
               <a:ext uri="{28A0092B-C50C-407E-A947-70E740481C1C}">
                 <a14:useLocalDpi xmlns:a14="http://schemas.microsoft.com/office/drawing/2010/main" val="0"/>
@@ -14067,7 +14149,7 @@
           <p:nvPr/>
         </p:nvPicPr>
         <p:blipFill>
-          <a:blip r:embed="rId2">
+          <a:blip r:embed="rId2" cstate="hqprint">
             <a:extLst>
               <a:ext uri="{28A0092B-C50C-407E-A947-70E740481C1C}">
                 <a14:useLocalDpi xmlns:a14="http://schemas.microsoft.com/office/drawing/2010/main" val="0"/>
@@ -14737,7 +14819,7 @@
           <p:nvPr/>
         </p:nvPicPr>
         <p:blipFill>
-          <a:blip r:embed="rId2">
+          <a:blip r:embed="rId2" cstate="hqprint">
             <a:extLst>
               <a:ext uri="{28A0092B-C50C-407E-A947-70E740481C1C}">
                 <a14:useLocalDpi xmlns:a14="http://schemas.microsoft.com/office/drawing/2010/main" val="0"/>
@@ -15421,7 +15503,7 @@
           <p:nvPr/>
         </p:nvPicPr>
         <p:blipFill>
-          <a:blip r:embed="rId2">
+          <a:blip r:embed="rId2" cstate="hqprint">
             <a:extLst>
               <a:ext uri="{28A0092B-C50C-407E-A947-70E740481C1C}">
                 <a14:useLocalDpi xmlns:a14="http://schemas.microsoft.com/office/drawing/2010/main" val="0"/>
@@ -16171,7 +16253,7 @@
           <p:nvPr/>
         </p:nvPicPr>
         <p:blipFill>
-          <a:blip r:embed="rId2">
+          <a:blip r:embed="rId2" cstate="hqprint">
             <a:extLst>
               <a:ext uri="{28A0092B-C50C-407E-A947-70E740481C1C}">
                 <a14:useLocalDpi xmlns:a14="http://schemas.microsoft.com/office/drawing/2010/main" val="0"/>
@@ -16865,7 +16947,7 @@
           <p:nvPr/>
         </p:nvPicPr>
         <p:blipFill>
-          <a:blip r:embed="rId2">
+          <a:blip r:embed="rId2" cstate="hqprint">
             <a:extLst>
               <a:ext uri="{28A0092B-C50C-407E-A947-70E740481C1C}">
                 <a14:useLocalDpi xmlns:a14="http://schemas.microsoft.com/office/drawing/2010/main" val="0"/>
@@ -17595,7 +17677,7 @@
           <p:nvPr/>
         </p:nvPicPr>
         <p:blipFill>
-          <a:blip r:embed="rId2">
+          <a:blip r:embed="rId2" cstate="hqprint">
             <a:extLst>
               <a:ext uri="{28A0092B-C50C-407E-A947-70E740481C1C}">
                 <a14:useLocalDpi xmlns:a14="http://schemas.microsoft.com/office/drawing/2010/main" val="0"/>
@@ -18303,7 +18385,7 @@
           <p:nvPr/>
         </p:nvPicPr>
         <p:blipFill>
-          <a:blip r:embed="rId2">
+          <a:blip r:embed="rId2" cstate="hqprint">
             <a:extLst>
               <a:ext uri="{28A0092B-C50C-407E-A947-70E740481C1C}">
                 <a14:useLocalDpi xmlns:a14="http://schemas.microsoft.com/office/drawing/2010/main" val="0"/>
@@ -18926,7 +19008,7 @@
           <p:nvPr/>
         </p:nvPicPr>
         <p:blipFill>
-          <a:blip r:embed="rId2">
+          <a:blip r:embed="rId2" cstate="hqprint">
             <a:extLst>
               <a:ext uri="{28A0092B-C50C-407E-A947-70E740481C1C}">
                 <a14:useLocalDpi xmlns:a14="http://schemas.microsoft.com/office/drawing/2010/main" val="0"/>
@@ -19649,7 +19731,7 @@
           <p:nvPr/>
         </p:nvPicPr>
         <p:blipFill>
-          <a:blip r:embed="rId2">
+          <a:blip r:embed="rId2" cstate="hqprint">
             <a:extLst>
               <a:ext uri="{28A0092B-C50C-407E-A947-70E740481C1C}">
                 <a14:useLocalDpi xmlns:a14="http://schemas.microsoft.com/office/drawing/2010/main" val="0"/>
@@ -20364,7 +20446,7 @@
           <p:nvPr/>
         </p:nvPicPr>
         <p:blipFill>
-          <a:blip r:embed="rId2">
+          <a:blip r:embed="rId2" cstate="hqprint">
             <a:extLst>
               <a:ext uri="{28A0092B-C50C-407E-A947-70E740481C1C}">
                 <a14:useLocalDpi xmlns:a14="http://schemas.microsoft.com/office/drawing/2010/main" val="0"/>
@@ -21016,7 +21098,7 @@
           <p:nvPr/>
         </p:nvPicPr>
         <p:blipFill>
-          <a:blip r:embed="rId2">
+          <a:blip r:embed="rId2" cstate="hqprint">
             <a:extLst>
               <a:ext uri="{28A0092B-C50C-407E-A947-70E740481C1C}">
                 <a14:useLocalDpi xmlns:a14="http://schemas.microsoft.com/office/drawing/2010/main" val="0"/>
@@ -21696,7 +21778,7 @@
                 <a:hlinkClick r:id="rId2">
                   <a:extLst>
                     <a:ext uri="{A12FA001-AC4F-418D-AE19-62706E023703}">
-                      <ahyp:hlinkClr xmlns:ahyp="http://schemas.microsoft.com/office/drawing/2018/hyperlinkcolor" val="tx"/>
+                      <ahyp:hlinkClr xmlns:ahyp="http://schemas.microsoft.com/office/drawing/2018/hyperlinkcolor" xmlns="" val="tx"/>
                     </a:ext>
                   </a:extLst>
                 </a:hlinkClick>
@@ -21721,7 +21803,7 @@
                 <a:hlinkClick r:id="rId3">
                   <a:extLst>
                     <a:ext uri="{A12FA001-AC4F-418D-AE19-62706E023703}">
-                      <ahyp:hlinkClr xmlns:ahyp="http://schemas.microsoft.com/office/drawing/2018/hyperlinkcolor" val="tx"/>
+                      <ahyp:hlinkClr xmlns:ahyp="http://schemas.microsoft.com/office/drawing/2018/hyperlinkcolor" xmlns="" val="tx"/>
                     </a:ext>
                   </a:extLst>
                 </a:hlinkClick>
@@ -21746,7 +21828,7 @@
                 <a:hlinkClick r:id="rId4">
                   <a:extLst>
                     <a:ext uri="{A12FA001-AC4F-418D-AE19-62706E023703}">
-                      <ahyp:hlinkClr xmlns:ahyp="http://schemas.microsoft.com/office/drawing/2018/hyperlinkcolor" val="tx"/>
+                      <ahyp:hlinkClr xmlns:ahyp="http://schemas.microsoft.com/office/drawing/2018/hyperlinkcolor" xmlns="" val="tx"/>
                     </a:ext>
                   </a:extLst>
                 </a:hlinkClick>
@@ -21762,7 +21844,7 @@
                 <a:hlinkClick r:id="rId4">
                   <a:extLst>
                     <a:ext uri="{A12FA001-AC4F-418D-AE19-62706E023703}">
-                      <ahyp:hlinkClr xmlns:ahyp="http://schemas.microsoft.com/office/drawing/2018/hyperlinkcolor" val="tx"/>
+                      <ahyp:hlinkClr xmlns:ahyp="http://schemas.microsoft.com/office/drawing/2018/hyperlinkcolor" xmlns="" val="tx"/>
                     </a:ext>
                   </a:extLst>
                 </a:hlinkClick>
@@ -21792,7 +21874,7 @@
                 <a:hlinkClick r:id="rId5">
                   <a:extLst>
                     <a:ext uri="{A12FA001-AC4F-418D-AE19-62706E023703}">
-                      <ahyp:hlinkClr xmlns:ahyp="http://schemas.microsoft.com/office/drawing/2018/hyperlinkcolor" val="tx"/>
+                      <ahyp:hlinkClr xmlns:ahyp="http://schemas.microsoft.com/office/drawing/2018/hyperlinkcolor" xmlns="" val="tx"/>
                     </a:ext>
                   </a:extLst>
                 </a:hlinkClick>
@@ -21843,7 +21925,7 @@
           <p:nvPr/>
         </p:nvPicPr>
         <p:blipFill>
-          <a:blip r:embed="rId6">
+          <a:blip r:embed="rId6" cstate="hqprint">
             <a:extLst>
               <a:ext uri="{28A0092B-C50C-407E-A947-70E740481C1C}">
                 <a14:useLocalDpi xmlns:a14="http://schemas.microsoft.com/office/drawing/2010/main" val="0"/>
@@ -22395,7 +22477,7 @@
           <p:nvPr/>
         </p:nvPicPr>
         <p:blipFill>
-          <a:blip r:embed="rId2">
+          <a:blip r:embed="rId2" cstate="hqprint">
             <a:extLst>
               <a:ext uri="{28A0092B-C50C-407E-A947-70E740481C1C}">
                 <a14:useLocalDpi xmlns:a14="http://schemas.microsoft.com/office/drawing/2010/main" val="0"/>
@@ -23029,7 +23111,7 @@
           <p:nvPr/>
         </p:nvPicPr>
         <p:blipFill>
-          <a:blip r:embed="rId2">
+          <a:blip r:embed="rId2" cstate="hqprint">
             <a:extLst>
               <a:ext uri="{28A0092B-C50C-407E-A947-70E740481C1C}">
                 <a14:useLocalDpi xmlns:a14="http://schemas.microsoft.com/office/drawing/2010/main" val="0"/>
@@ -23664,7 +23746,7 @@
           <p:nvPr/>
         </p:nvPicPr>
         <p:blipFill>
-          <a:blip r:embed="rId2">
+          <a:blip r:embed="rId2" cstate="hqprint">
             <a:extLst>
               <a:ext uri="{28A0092B-C50C-407E-A947-70E740481C1C}">
                 <a14:useLocalDpi xmlns:a14="http://schemas.microsoft.com/office/drawing/2010/main" val="0"/>
@@ -24307,7 +24389,7 @@
           <p:nvPr/>
         </p:nvPicPr>
         <p:blipFill>
-          <a:blip r:embed="rId2">
+          <a:blip r:embed="rId2" cstate="hqprint">
             <a:extLst>
               <a:ext uri="{28A0092B-C50C-407E-A947-70E740481C1C}">
                 <a14:useLocalDpi xmlns:a14="http://schemas.microsoft.com/office/drawing/2010/main" val="0"/>
@@ -24967,7 +25049,7 @@
           <p:nvPr/>
         </p:nvPicPr>
         <p:blipFill>
-          <a:blip r:embed="rId2">
+          <a:blip r:embed="rId2" cstate="hqprint">
             <a:extLst>
               <a:ext uri="{28A0092B-C50C-407E-A947-70E740481C1C}">
                 <a14:useLocalDpi xmlns:a14="http://schemas.microsoft.com/office/drawing/2010/main" val="0"/>
@@ -25720,7 +25802,7 @@
           <p:nvPr/>
         </p:nvPicPr>
         <p:blipFill>
-          <a:blip r:embed="rId2">
+          <a:blip r:embed="rId2" cstate="hqprint">
             <a:extLst>
               <a:ext uri="{28A0092B-C50C-407E-A947-70E740481C1C}">
                 <a14:useLocalDpi xmlns:a14="http://schemas.microsoft.com/office/drawing/2010/main" val="0"/>
@@ -26400,7 +26482,7 @@
           <p:nvPr/>
         </p:nvPicPr>
         <p:blipFill>
-          <a:blip r:embed="rId2">
+          <a:blip r:embed="rId2" cstate="hqprint">
             <a:extLst>
               <a:ext uri="{28A0092B-C50C-407E-A947-70E740481C1C}">
                 <a14:useLocalDpi xmlns:a14="http://schemas.microsoft.com/office/drawing/2010/main" val="0"/>

</xml_diff>

<commit_message>
Fixed some maths equations in the framerate discussion
</commit_message>
<xml_diff>
--- a/NUGameDev/UnityIntro.pptx
+++ b/NUGameDev/UnityIntro.pptx
@@ -372,7 +372,7 @@
           <a:p>
             <a:fld id="{17CAAE78-7B8D-48EA-A6F8-033DA94F316B}" type="datetimeFigureOut">
               <a:rPr lang="en-GB" smtClean="0"/>
-              <a:t>20/12/2019</a:t>
+              <a:t>22/12/2019</a:t>
             </a:fld>
             <a:endParaRPr lang="en-GB"/>
           </a:p>
@@ -572,7 +572,7 @@
           <a:p>
             <a:fld id="{17CAAE78-7B8D-48EA-A6F8-033DA94F316B}" type="datetimeFigureOut">
               <a:rPr lang="en-GB" smtClean="0"/>
-              <a:t>20/12/2019</a:t>
+              <a:t>22/12/2019</a:t>
             </a:fld>
             <a:endParaRPr lang="en-GB"/>
           </a:p>
@@ -782,7 +782,7 @@
           <a:p>
             <a:fld id="{17CAAE78-7B8D-48EA-A6F8-033DA94F316B}" type="datetimeFigureOut">
               <a:rPr lang="en-GB" smtClean="0"/>
-              <a:t>20/12/2019</a:t>
+              <a:t>22/12/2019</a:t>
             </a:fld>
             <a:endParaRPr lang="en-GB"/>
           </a:p>
@@ -982,7 +982,7 @@
           <a:p>
             <a:fld id="{17CAAE78-7B8D-48EA-A6F8-033DA94F316B}" type="datetimeFigureOut">
               <a:rPr lang="en-GB" smtClean="0"/>
-              <a:t>20/12/2019</a:t>
+              <a:t>22/12/2019</a:t>
             </a:fld>
             <a:endParaRPr lang="en-GB"/>
           </a:p>
@@ -1258,7 +1258,7 @@
           <a:p>
             <a:fld id="{17CAAE78-7B8D-48EA-A6F8-033DA94F316B}" type="datetimeFigureOut">
               <a:rPr lang="en-GB" smtClean="0"/>
-              <a:t>20/12/2019</a:t>
+              <a:t>22/12/2019</a:t>
             </a:fld>
             <a:endParaRPr lang="en-GB"/>
           </a:p>
@@ -1526,7 +1526,7 @@
           <a:p>
             <a:fld id="{17CAAE78-7B8D-48EA-A6F8-033DA94F316B}" type="datetimeFigureOut">
               <a:rPr lang="en-GB" smtClean="0"/>
-              <a:t>20/12/2019</a:t>
+              <a:t>22/12/2019</a:t>
             </a:fld>
             <a:endParaRPr lang="en-GB"/>
           </a:p>
@@ -1941,7 +1941,7 @@
           <a:p>
             <a:fld id="{17CAAE78-7B8D-48EA-A6F8-033DA94F316B}" type="datetimeFigureOut">
               <a:rPr lang="en-GB" smtClean="0"/>
-              <a:t>20/12/2019</a:t>
+              <a:t>22/12/2019</a:t>
             </a:fld>
             <a:endParaRPr lang="en-GB"/>
           </a:p>
@@ -2083,7 +2083,7 @@
           <a:p>
             <a:fld id="{17CAAE78-7B8D-48EA-A6F8-033DA94F316B}" type="datetimeFigureOut">
               <a:rPr lang="en-GB" smtClean="0"/>
-              <a:t>20/12/2019</a:t>
+              <a:t>22/12/2019</a:t>
             </a:fld>
             <a:endParaRPr lang="en-GB"/>
           </a:p>
@@ -2196,7 +2196,7 @@
           <a:p>
             <a:fld id="{17CAAE78-7B8D-48EA-A6F8-033DA94F316B}" type="datetimeFigureOut">
               <a:rPr lang="en-GB" smtClean="0"/>
-              <a:t>20/12/2019</a:t>
+              <a:t>22/12/2019</a:t>
             </a:fld>
             <a:endParaRPr lang="en-GB"/>
           </a:p>
@@ -2509,7 +2509,7 @@
           <a:p>
             <a:fld id="{17CAAE78-7B8D-48EA-A6F8-033DA94F316B}" type="datetimeFigureOut">
               <a:rPr lang="en-GB" smtClean="0"/>
-              <a:t>20/12/2019</a:t>
+              <a:t>22/12/2019</a:t>
             </a:fld>
             <a:endParaRPr lang="en-GB"/>
           </a:p>
@@ -2798,7 +2798,7 @@
           <a:p>
             <a:fld id="{17CAAE78-7B8D-48EA-A6F8-033DA94F316B}" type="datetimeFigureOut">
               <a:rPr lang="en-GB" smtClean="0"/>
-              <a:t>20/12/2019</a:t>
+              <a:t>22/12/2019</a:t>
             </a:fld>
             <a:endParaRPr lang="en-GB"/>
           </a:p>
@@ -3041,7 +3041,7 @@
           <a:p>
             <a:fld id="{17CAAE78-7B8D-48EA-A6F8-033DA94F316B}" type="datetimeFigureOut">
               <a:rPr lang="en-GB" smtClean="0"/>
-              <a:t>20/12/2019</a:t>
+              <a:t>22/12/2019</a:t>
             </a:fld>
             <a:endParaRPr lang="en-GB"/>
           </a:p>
@@ -5129,12 +5129,6 @@
             <a:pPr marL="0" indent="0" algn="ctr">
               <a:buNone/>
             </a:pPr>
-            <a:r>
-              <a:rPr lang="en-GB" sz="1800" dirty="0">
-                <a:latin typeface="Bahnschrift" panose="020B0502040204020203" pitchFamily="34" charset="0"/>
-              </a:rPr>
-              <a:t/>
-            </a:r>
             <a:br>
               <a:rPr lang="en-GB" sz="1800" dirty="0">
                 <a:latin typeface="Bahnschrift" panose="020B0502040204020203" pitchFamily="34" charset="0"/>
@@ -5144,32 +5138,19 @@
               <a:rPr lang="en-GB" sz="1200" i="1" dirty="0">
                 <a:latin typeface="Bahnschrift" panose="020B0502040204020203" pitchFamily="34" charset="0"/>
               </a:rPr>
-              <a:t>*If you don’t have Visual Studio installed, go do </a:t>
-            </a:r>
-            <a:r>
-              <a:rPr lang="en-GB" sz="1200" i="1" dirty="0" smtClean="0">
-                <a:latin typeface="Bahnschrift" panose="020B0502040204020203" pitchFamily="34" charset="0"/>
-              </a:rPr>
-              <a:t>that</a:t>
+              <a:t>*If you don’t have Visual Studio installed, go do that</a:t>
             </a:r>
             <a:br>
-              <a:rPr lang="en-GB" sz="1200" i="1" dirty="0" smtClean="0">
+              <a:rPr lang="en-GB" sz="1200" i="1" dirty="0">
                 <a:latin typeface="Bahnschrift" panose="020B0502040204020203" pitchFamily="34" charset="0"/>
               </a:rPr>
             </a:br>
             <a:r>
-              <a:rPr lang="en-GB" sz="1200" i="1" dirty="0" smtClean="0">
+              <a:rPr lang="en-GB" sz="1200" i="1" dirty="0">
                 <a:latin typeface="Bahnschrift" panose="020B0502040204020203" pitchFamily="34" charset="0"/>
                 <a:hlinkClick r:id="rId2"/>
               </a:rPr>
-              <a:t>https</a:t>
-            </a:r>
-            <a:r>
-              <a:rPr lang="en-GB" sz="1200" i="1" dirty="0">
-                <a:latin typeface="Bahnschrift" panose="020B0502040204020203" pitchFamily="34" charset="0"/>
-                <a:hlinkClick r:id="rId2"/>
-              </a:rPr>
-              <a:t>://visualstudio.microsoft.com/downloads/</a:t>
+              <a:t>https://visualstudio.microsoft.com/downloads/</a:t>
             </a:r>
             <a:endParaRPr lang="en-GB" sz="1200" i="1" dirty="0">
               <a:latin typeface="Bahnschrift" panose="020B0502040204020203" pitchFamily="34" charset="0"/>
@@ -10685,7 +10666,7 @@
                 <a:hlinkClick r:id="rId2">
                   <a:extLst>
                     <a:ext uri="{A12FA001-AC4F-418D-AE19-62706E023703}">
-                      <ahyp:hlinkClr xmlns:ahyp="http://schemas.microsoft.com/office/drawing/2018/hyperlinkcolor" xmlns="" val="tx"/>
+                      <ahyp:hlinkClr xmlns:ahyp="http://schemas.microsoft.com/office/drawing/2018/hyperlinkcolor" val="tx"/>
                     </a:ext>
                   </a:extLst>
                 </a:hlinkClick>
@@ -10710,7 +10691,7 @@
                 <a:hlinkClick r:id="rId3">
                   <a:extLst>
                     <a:ext uri="{A12FA001-AC4F-418D-AE19-62706E023703}">
-                      <ahyp:hlinkClr xmlns:ahyp="http://schemas.microsoft.com/office/drawing/2018/hyperlinkcolor" xmlns="" val="tx"/>
+                      <ahyp:hlinkClr xmlns:ahyp="http://schemas.microsoft.com/office/drawing/2018/hyperlinkcolor" val="tx"/>
                     </a:ext>
                   </a:extLst>
                 </a:hlinkClick>
@@ -10735,7 +10716,7 @@
                 <a:hlinkClick r:id="rId4">
                   <a:extLst>
                     <a:ext uri="{A12FA001-AC4F-418D-AE19-62706E023703}">
-                      <ahyp:hlinkClr xmlns:ahyp="http://schemas.microsoft.com/office/drawing/2018/hyperlinkcolor" xmlns="" val="tx"/>
+                      <ahyp:hlinkClr xmlns:ahyp="http://schemas.microsoft.com/office/drawing/2018/hyperlinkcolor" val="tx"/>
                     </a:ext>
                   </a:extLst>
                 </a:hlinkClick>
@@ -10751,7 +10732,7 @@
                 <a:hlinkClick r:id="rId4">
                   <a:extLst>
                     <a:ext uri="{A12FA001-AC4F-418D-AE19-62706E023703}">
-                      <ahyp:hlinkClr xmlns:ahyp="http://schemas.microsoft.com/office/drawing/2018/hyperlinkcolor" xmlns="" val="tx"/>
+                      <ahyp:hlinkClr xmlns:ahyp="http://schemas.microsoft.com/office/drawing/2018/hyperlinkcolor" val="tx"/>
                     </a:ext>
                   </a:extLst>
                 </a:hlinkClick>
@@ -11307,266 +11288,813 @@
           </a:p>
         </p:txBody>
       </p:sp>
-      <p:sp>
-        <p:nvSpPr>
-          <p:cNvPr id="3" name="Content Placeholder 2">
-            <a:extLst>
-              <a:ext uri="{FF2B5EF4-FFF2-40B4-BE49-F238E27FC236}">
-                <a16:creationId xmlns:a16="http://schemas.microsoft.com/office/drawing/2014/main" id="{18999FBF-B204-4B93-939E-906097ADC133}"/>
-              </a:ext>
-            </a:extLst>
-          </p:cNvPr>
-          <p:cNvSpPr>
-            <a:spLocks noGrp="1"/>
-          </p:cNvSpPr>
-          <p:nvPr>
-            <p:ph idx="1"/>
-          </p:nvPr>
-        </p:nvSpPr>
-        <p:spPr>
-          <a:xfrm>
-            <a:off x="1136429" y="2278173"/>
-            <a:ext cx="7474171" cy="4424631"/>
-          </a:xfrm>
-        </p:spPr>
-        <p:txBody>
-          <a:bodyPr anchor="t">
-            <a:normAutofit/>
-          </a:bodyPr>
-          <a:lstStyle/>
-          <a:p>
-            <a:r>
-              <a:rPr lang="en-GB" sz="1800" dirty="0" smtClean="0">
-                <a:latin typeface="Bahnschrift" panose="020B0502040204020203" pitchFamily="34" charset="0"/>
-              </a:rPr>
-              <a:t>Time.deltaTime</a:t>
-            </a:r>
-            <a:r>
-              <a:rPr lang="en-GB" sz="1800" dirty="0">
-                <a:latin typeface="Bahnschrift" panose="020B0502040204020203" pitchFamily="34" charset="0"/>
-              </a:rPr>
-              <a:t> returns the amount of </a:t>
-            </a:r>
-            <a:r>
-              <a:rPr lang="en-GB" sz="1800" dirty="0" smtClean="0">
-                <a:latin typeface="Bahnschrift" panose="020B0502040204020203" pitchFamily="34" charset="0"/>
-              </a:rPr>
-              <a:t>time </a:t>
-            </a:r>
-            <a:r>
-              <a:rPr lang="en-GB" sz="1800" dirty="0">
-                <a:latin typeface="Bahnschrift" panose="020B0502040204020203" pitchFamily="34" charset="0"/>
-              </a:rPr>
-              <a:t>since the last </a:t>
-            </a:r>
-            <a:r>
-              <a:rPr lang="en-GB" sz="1800" dirty="0" smtClean="0">
-                <a:latin typeface="Bahnschrift" panose="020B0502040204020203" pitchFamily="34" charset="0"/>
-              </a:rPr>
-              <a:t>frame </a:t>
-            </a:r>
-            <a:endParaRPr lang="en-GB" sz="1800" dirty="0">
-              <a:latin typeface="Bahnschrift" panose="020B0502040204020203" pitchFamily="34" charset="0"/>
-            </a:endParaRPr>
-          </a:p>
-          <a:p>
-            <a:r>
-              <a:rPr lang="en-GB" sz="1800" dirty="0">
-                <a:latin typeface="Bahnschrift" panose="020B0502040204020203" pitchFamily="34" charset="0"/>
-              </a:rPr>
-              <a:t>If we run at 60FPS</a:t>
-            </a:r>
-          </a:p>
-          <a:p>
-            <a:pPr lvl="1"/>
-            <a:r>
-              <a:rPr lang="en-GB" sz="1400" dirty="0">
-                <a:latin typeface="Bahnschrift" panose="020B0502040204020203" pitchFamily="34" charset="0"/>
-              </a:rPr>
-              <a:t>Each frame is on screen for </a:t>
-            </a:r>
-            <a:r>
-              <a:rPr lang="en-GB" sz="1400" dirty="0" smtClean="0">
-                <a:latin typeface="Bahnschrift" panose="020B0502040204020203" pitchFamily="34" charset="0"/>
-              </a:rPr>
-              <a:t>      seconds </a:t>
-            </a:r>
-            <a:r>
-              <a:rPr lang="en-GB" sz="1400" dirty="0">
-                <a:latin typeface="Bahnschrift" panose="020B0502040204020203" pitchFamily="34" charset="0"/>
-              </a:rPr>
-              <a:t>= 1 ÷ 60 = 0.016 (approx.)</a:t>
-            </a:r>
-          </a:p>
-          <a:p>
-            <a:r>
-              <a:rPr lang="en-GB" sz="1800" dirty="0">
-                <a:latin typeface="Bahnschrift" panose="020B0502040204020203" pitchFamily="34" charset="0"/>
-              </a:rPr>
-              <a:t>If we run at 30FPS</a:t>
-            </a:r>
-          </a:p>
-          <a:p>
-            <a:pPr lvl="1"/>
-            <a:r>
-              <a:rPr lang="en-GB" sz="1400" dirty="0">
-                <a:latin typeface="Bahnschrift" panose="020B0502040204020203" pitchFamily="34" charset="0"/>
-              </a:rPr>
-              <a:t>Each frame is on screen for    </a:t>
-            </a:r>
-            <a:r>
-              <a:rPr lang="en-GB" sz="1400" dirty="0" smtClean="0">
-                <a:latin typeface="Bahnschrift" panose="020B0502040204020203" pitchFamily="34" charset="0"/>
-              </a:rPr>
-              <a:t>   </a:t>
-            </a:r>
-            <a:r>
-              <a:rPr lang="en-GB" sz="1400" dirty="0">
-                <a:latin typeface="Bahnschrift" panose="020B0502040204020203" pitchFamily="34" charset="0"/>
-              </a:rPr>
-              <a:t>seconds = 1 ÷ 30 = 0.033 (approx.)</a:t>
-            </a:r>
-          </a:p>
-          <a:p>
-            <a:r>
-              <a:rPr lang="en-GB" sz="1800" dirty="0">
-                <a:latin typeface="Bahnschrift" panose="020B0502040204020203" pitchFamily="34" charset="0"/>
-              </a:rPr>
-              <a:t>If our speed is set to 4, and we multiply our speed by </a:t>
-            </a:r>
-            <a:r>
-              <a:rPr lang="en-GB" sz="1800" dirty="0" err="1">
-                <a:latin typeface="Bahnschrift" panose="020B0502040204020203" pitchFamily="34" charset="0"/>
-              </a:rPr>
-              <a:t>Time.deltaTime</a:t>
-            </a:r>
-            <a:endParaRPr lang="en-GB" sz="1800" dirty="0">
-              <a:latin typeface="Bahnschrift" panose="020B0502040204020203" pitchFamily="34" charset="0"/>
-            </a:endParaRPr>
-          </a:p>
-          <a:p>
-            <a:pPr lvl="1"/>
-            <a:r>
-              <a:rPr lang="en-GB" sz="1400" b="1" dirty="0">
-                <a:latin typeface="Bahnschrift" panose="020B0502040204020203" pitchFamily="34" charset="0"/>
-              </a:rPr>
-              <a:t>60FPS:</a:t>
-            </a:r>
-            <a:r>
-              <a:rPr lang="en-GB" sz="1400" dirty="0">
-                <a:latin typeface="Bahnschrift" panose="020B0502040204020203" pitchFamily="34" charset="0"/>
-              </a:rPr>
-              <a:t> Each frame the player moves 4 * 0.016 = 0.064 units</a:t>
-            </a:r>
-            <a:br>
-              <a:rPr lang="en-GB" sz="1400" dirty="0">
-                <a:latin typeface="Bahnschrift" panose="020B0502040204020203" pitchFamily="34" charset="0"/>
-              </a:rPr>
-            </a:br>
-            <a:r>
-              <a:rPr lang="en-GB" sz="1400" b="1" dirty="0">
-                <a:solidFill>
-                  <a:schemeClr val="bg1"/>
-                </a:solidFill>
-                <a:latin typeface="Bahnschrift" panose="020B0502040204020203" pitchFamily="34" charset="0"/>
-              </a:rPr>
-              <a:t>60FPS:</a:t>
-            </a:r>
-            <a:r>
-              <a:rPr lang="en-GB" sz="1400" dirty="0">
-                <a:latin typeface="Bahnschrift" panose="020B0502040204020203" pitchFamily="34" charset="0"/>
-              </a:rPr>
-              <a:t> Each second the player moves 60 * 0.064 = </a:t>
-            </a:r>
-            <a:r>
-              <a:rPr lang="en-GB" sz="1400" b="1" u="sng" dirty="0">
-                <a:latin typeface="Bahnschrift" panose="020B0502040204020203" pitchFamily="34" charset="0"/>
-              </a:rPr>
-              <a:t>3.84 units</a:t>
-            </a:r>
-          </a:p>
-          <a:p>
-            <a:pPr lvl="1"/>
-            <a:r>
-              <a:rPr lang="en-GB" sz="1400" b="1" dirty="0">
-                <a:latin typeface="Bahnschrift" panose="020B0502040204020203" pitchFamily="34" charset="0"/>
-              </a:rPr>
-              <a:t>30FPS:</a:t>
-            </a:r>
-            <a:r>
-              <a:rPr lang="en-GB" sz="1400" dirty="0">
-                <a:latin typeface="Bahnschrift" panose="020B0502040204020203" pitchFamily="34" charset="0"/>
-              </a:rPr>
-              <a:t> Each frame the player moves 4 * 0.033 = 0.132 units</a:t>
-            </a:r>
-            <a:br>
-              <a:rPr lang="en-GB" sz="1400" dirty="0">
-                <a:latin typeface="Bahnschrift" panose="020B0502040204020203" pitchFamily="34" charset="0"/>
-              </a:rPr>
-            </a:br>
-            <a:r>
-              <a:rPr lang="en-GB" sz="1400" dirty="0">
-                <a:solidFill>
-                  <a:schemeClr val="bg1"/>
-                </a:solidFill>
-                <a:latin typeface="Bahnschrift" panose="020B0502040204020203" pitchFamily="34" charset="0"/>
-              </a:rPr>
-              <a:t>30FPS:</a:t>
-            </a:r>
-            <a:r>
-              <a:rPr lang="en-GB" sz="1400" dirty="0">
-                <a:latin typeface="Bahnschrift" panose="020B0502040204020203" pitchFamily="34" charset="0"/>
-              </a:rPr>
-              <a:t> Each second the player moves 30 * 0.132 = </a:t>
-            </a:r>
-            <a:r>
-              <a:rPr lang="en-GB" sz="1400" b="1" u="sng" dirty="0">
-                <a:latin typeface="Bahnschrift" panose="020B0502040204020203" pitchFamily="34" charset="0"/>
-              </a:rPr>
-              <a:t>3.96 units</a:t>
-            </a:r>
-          </a:p>
-          <a:p>
-            <a:pPr lvl="1"/>
-            <a:r>
-              <a:rPr lang="en-GB" sz="1400" dirty="0">
-                <a:latin typeface="Bahnschrift" panose="020B0502040204020203" pitchFamily="34" charset="0"/>
-              </a:rPr>
-              <a:t>There’s still a small difference, but it’s much better than </a:t>
-            </a:r>
-            <a:br>
-              <a:rPr lang="en-GB" sz="1400" dirty="0">
-                <a:latin typeface="Bahnschrift" panose="020B0502040204020203" pitchFamily="34" charset="0"/>
-              </a:rPr>
-            </a:br>
-            <a:r>
-              <a:rPr lang="en-GB" sz="1400" dirty="0">
-                <a:latin typeface="Bahnschrift" panose="020B0502040204020203" pitchFamily="34" charset="0"/>
-              </a:rPr>
-              <a:t>one player moving twice as fast</a:t>
-            </a:r>
-          </a:p>
-          <a:p>
-            <a:r>
-              <a:rPr lang="en-GB" sz="1800" dirty="0">
-                <a:latin typeface="Bahnschrift" panose="020B0502040204020203" pitchFamily="34" charset="0"/>
-              </a:rPr>
-              <a:t>Note: With this implemented, you’ll probably need to increase your</a:t>
-            </a:r>
-            <a:br>
-              <a:rPr lang="en-GB" sz="1800" dirty="0">
-                <a:latin typeface="Bahnschrift" panose="020B0502040204020203" pitchFamily="34" charset="0"/>
-              </a:rPr>
-            </a:br>
-            <a:r>
-              <a:rPr lang="en-GB" sz="1800" dirty="0">
-                <a:latin typeface="Bahnschrift" panose="020B0502040204020203" pitchFamily="34" charset="0"/>
-              </a:rPr>
-              <a:t>          speed variable</a:t>
-            </a:r>
-          </a:p>
-        </p:txBody>
-      </p:sp>
+      <mc:AlternateContent xmlns:mc="http://schemas.openxmlformats.org/markup-compatibility/2006">
+        <mc:Choice xmlns:a14="http://schemas.microsoft.com/office/drawing/2010/main" Requires="a14">
+          <p:sp>
+            <p:nvSpPr>
+              <p:cNvPr id="3" name="Content Placeholder 2">
+                <a:extLst>
+                  <a:ext uri="{FF2B5EF4-FFF2-40B4-BE49-F238E27FC236}">
+                    <a16:creationId xmlns:a16="http://schemas.microsoft.com/office/drawing/2014/main" id="{18999FBF-B204-4B93-939E-906097ADC133}"/>
+                  </a:ext>
+                </a:extLst>
+              </p:cNvPr>
+              <p:cNvSpPr>
+                <a:spLocks noGrp="1"/>
+              </p:cNvSpPr>
+              <p:nvPr>
+                <p:ph idx="1"/>
+              </p:nvPr>
+            </p:nvSpPr>
+            <p:spPr>
+              <a:xfrm>
+                <a:off x="1136429" y="2278174"/>
+                <a:ext cx="7474171" cy="4500132"/>
+              </a:xfrm>
+            </p:spPr>
+            <p:txBody>
+              <a:bodyPr anchor="t">
+                <a:normAutofit lnSpcReduction="10000"/>
+              </a:bodyPr>
+              <a:lstStyle/>
+              <a:p>
+                <a:r>
+                  <a:rPr lang="en-GB" sz="1800" dirty="0">
+                    <a:latin typeface="Bahnschrift" panose="020B0502040204020203" pitchFamily="34" charset="0"/>
+                  </a:rPr>
+                  <a:t>Time.deltaTime returns the amount of time since the last frame </a:t>
+                </a:r>
+              </a:p>
+              <a:p>
+                <a:r>
+                  <a:rPr lang="en-GB" sz="1800" dirty="0">
+                    <a:latin typeface="Bahnschrift" panose="020B0502040204020203" pitchFamily="34" charset="0"/>
+                  </a:rPr>
+                  <a:t>If we run at 60FPS</a:t>
+                </a:r>
+              </a:p>
+              <a:p>
+                <a:pPr lvl="1"/>
+                <a:r>
+                  <a:rPr lang="en-GB" sz="1400" dirty="0">
+                    <a:latin typeface="Bahnschrift" panose="020B0502040204020203" pitchFamily="34" charset="0"/>
+                  </a:rPr>
+                  <a:t>Each frame is on screen for </a:t>
+                </a:r>
+                <a14:m>
+                  <m:oMath xmlns:m="http://schemas.openxmlformats.org/officeDocument/2006/math">
+                    <m:f>
+                      <m:fPr>
+                        <m:ctrlPr>
+                          <a:rPr lang="en-GB" sz="1400" i="1" smtClean="0">
+                            <a:latin typeface="Cambria Math" panose="02040503050406030204" pitchFamily="18" charset="0"/>
+                          </a:rPr>
+                        </m:ctrlPr>
+                      </m:fPr>
+                      <m:num>
+                        <m:r>
+                          <m:rPr>
+                            <m:nor/>
+                          </m:rPr>
+                          <a:rPr lang="en-GB" sz="1400" b="0" i="0" smtClean="0">
+                            <a:latin typeface="Bahnschrift" panose="020B0502040204020203" pitchFamily="34" charset="0"/>
+                          </a:rPr>
+                          <m:t>1</m:t>
+                        </m:r>
+                      </m:num>
+                      <m:den>
+                        <m:r>
+                          <m:rPr>
+                            <m:nor/>
+                          </m:rPr>
+                          <a:rPr lang="en-GB" sz="1400" b="0" i="0" smtClean="0">
+                            <a:latin typeface="Bahnschrift" panose="020B0502040204020203" pitchFamily="34" charset="0"/>
+                          </a:rPr>
+                          <m:t>60</m:t>
+                        </m:r>
+                      </m:den>
+                    </m:f>
+                    <m:r>
+                      <m:rPr>
+                        <m:nor/>
+                      </m:rPr>
+                      <a:rPr lang="en-GB" sz="1400" b="0" i="0" smtClean="0">
+                        <a:latin typeface="Bahnschrift" panose="020B0502040204020203" pitchFamily="34" charset="0"/>
+                      </a:rPr>
+                      <m:t> </m:t>
+                    </m:r>
+                  </m:oMath>
+                </a14:m>
+                <a:r>
+                  <a:rPr lang="en-GB" sz="1400" dirty="0">
+                    <a:latin typeface="Bahnschrift" panose="020B0502040204020203" pitchFamily="34" charset="0"/>
+                  </a:rPr>
+                  <a:t>seconds (approx. 0.0167)</a:t>
+                </a:r>
+              </a:p>
+              <a:p>
+                <a:r>
+                  <a:rPr lang="en-GB" sz="1800" dirty="0">
+                    <a:latin typeface="Bahnschrift" panose="020B0502040204020203" pitchFamily="34" charset="0"/>
+                  </a:rPr>
+                  <a:t>If we run at 30FPS</a:t>
+                </a:r>
+              </a:p>
+              <a:p>
+                <a:pPr lvl="1"/>
+                <a:r>
+                  <a:rPr lang="en-GB" sz="1400" dirty="0">
+                    <a:latin typeface="Bahnschrift" panose="020B0502040204020203" pitchFamily="34" charset="0"/>
+                  </a:rPr>
+                  <a:t>Each frame is on screen for </a:t>
+                </a:r>
+                <a14:m>
+                  <m:oMath xmlns:m="http://schemas.openxmlformats.org/officeDocument/2006/math">
+                    <m:f>
+                      <m:fPr>
+                        <m:ctrlPr>
+                          <a:rPr lang="en-GB" sz="1400" i="1" smtClean="0">
+                            <a:latin typeface="Cambria Math" panose="02040503050406030204" pitchFamily="18" charset="0"/>
+                          </a:rPr>
+                        </m:ctrlPr>
+                      </m:fPr>
+                      <m:num>
+                        <m:r>
+                          <m:rPr>
+                            <m:nor/>
+                          </m:rPr>
+                          <a:rPr lang="en-GB" sz="1400" b="0" i="0" smtClean="0">
+                            <a:latin typeface="Bahnschrift" panose="020B0502040204020203" pitchFamily="34" charset="0"/>
+                          </a:rPr>
+                          <m:t>1</m:t>
+                        </m:r>
+                      </m:num>
+                      <m:den>
+                        <m:r>
+                          <m:rPr>
+                            <m:nor/>
+                          </m:rPr>
+                          <a:rPr lang="en-GB" sz="1400" b="0" i="0" smtClean="0">
+                            <a:latin typeface="Bahnschrift" panose="020B0502040204020203" pitchFamily="34" charset="0"/>
+                          </a:rPr>
+                          <m:t>30</m:t>
+                        </m:r>
+                      </m:den>
+                    </m:f>
+                  </m:oMath>
+                </a14:m>
+                <a:r>
+                  <a:rPr lang="en-GB" sz="1400" dirty="0">
+                    <a:latin typeface="Bahnschrift" panose="020B0502040204020203" pitchFamily="34" charset="0"/>
+                  </a:rPr>
+                  <a:t> seconds (approx. 0.034)</a:t>
+                </a:r>
+              </a:p>
+              <a:p>
+                <a:r>
+                  <a:rPr lang="en-GB" sz="1800" dirty="0">
+                    <a:latin typeface="Bahnschrift" panose="020B0502040204020203" pitchFamily="34" charset="0"/>
+                  </a:rPr>
+                  <a:t>If our speed is set to 4, and we multiply our speed by </a:t>
+                </a:r>
+                <a:r>
+                  <a:rPr lang="en-GB" sz="1800" dirty="0" err="1">
+                    <a:latin typeface="Bahnschrift" panose="020B0502040204020203" pitchFamily="34" charset="0"/>
+                  </a:rPr>
+                  <a:t>Time.deltaTime</a:t>
+                </a:r>
+                <a:endParaRPr lang="en-GB" sz="1800" dirty="0">
+                  <a:latin typeface="Bahnschrift" panose="020B0502040204020203" pitchFamily="34" charset="0"/>
+                </a:endParaRPr>
+              </a:p>
+              <a:p>
+                <a:pPr lvl="1"/>
+                <a:r>
+                  <a:rPr lang="en-GB" sz="1400" b="1" dirty="0">
+                    <a:latin typeface="Bahnschrift" panose="020B0502040204020203" pitchFamily="34" charset="0"/>
+                  </a:rPr>
+                  <a:t>60FPS:</a:t>
+                </a:r>
+                <a:r>
+                  <a:rPr lang="en-GB" sz="1400" dirty="0">
+                    <a:latin typeface="Bahnschrift" panose="020B0502040204020203" pitchFamily="34" charset="0"/>
+                  </a:rPr>
+                  <a:t> Each frame the player moves </a:t>
+                </a:r>
+                <a14:m>
+                  <m:oMath xmlns:m="http://schemas.openxmlformats.org/officeDocument/2006/math">
+                    <m:r>
+                      <m:rPr>
+                        <m:nor/>
+                      </m:rPr>
+                      <a:rPr lang="en-GB" sz="1400" i="0">
+                        <a:latin typeface="Bahnschrift" panose="020B0502040204020203" pitchFamily="34" charset="0"/>
+                      </a:rPr>
+                      <m:t>4 </m:t>
+                    </m:r>
+                    <m:r>
+                      <m:rPr>
+                        <m:nor/>
+                      </m:rPr>
+                      <a:rPr lang="en-GB" sz="1400" i="0">
+                        <a:latin typeface="Bahnschrift" panose="020B0502040204020203" pitchFamily="34" charset="0"/>
+                        <a:ea typeface="Cambria Math" panose="02040503050406030204" pitchFamily="18" charset="0"/>
+                      </a:rPr>
+                      <m:t>×</m:t>
+                    </m:r>
+                    <m:r>
+                      <m:rPr>
+                        <m:nor/>
+                      </m:rPr>
+                      <a:rPr lang="en-GB" sz="1400" i="0">
+                        <a:latin typeface="Bahnschrift" panose="020B0502040204020203" pitchFamily="34" charset="0"/>
+                        <a:ea typeface="Cambria Math" panose="02040503050406030204" pitchFamily="18" charset="0"/>
+                      </a:rPr>
+                      <m:t> </m:t>
+                    </m:r>
+                    <m:f>
+                      <m:fPr>
+                        <m:ctrlPr>
+                          <a:rPr lang="en-GB" sz="1400" i="1">
+                            <a:latin typeface="Cambria Math" panose="02040503050406030204" pitchFamily="18" charset="0"/>
+                            <a:ea typeface="Cambria Math" panose="02040503050406030204" pitchFamily="18" charset="0"/>
+                          </a:rPr>
+                        </m:ctrlPr>
+                      </m:fPr>
+                      <m:num>
+                        <m:r>
+                          <m:rPr>
+                            <m:nor/>
+                          </m:rPr>
+                          <a:rPr lang="en-GB" sz="1400" i="0">
+                            <a:latin typeface="Bahnschrift" panose="020B0502040204020203" pitchFamily="34" charset="0"/>
+                            <a:ea typeface="Cambria Math" panose="02040503050406030204" pitchFamily="18" charset="0"/>
+                          </a:rPr>
+                          <m:t>1</m:t>
+                        </m:r>
+                      </m:num>
+                      <m:den>
+                        <m:r>
+                          <m:rPr>
+                            <m:nor/>
+                          </m:rPr>
+                          <a:rPr lang="en-GB" sz="1400" i="0">
+                            <a:latin typeface="Bahnschrift" panose="020B0502040204020203" pitchFamily="34" charset="0"/>
+                            <a:ea typeface="Cambria Math" panose="02040503050406030204" pitchFamily="18" charset="0"/>
+                          </a:rPr>
+                          <m:t>60</m:t>
+                        </m:r>
+                      </m:den>
+                    </m:f>
+                    <m:r>
+                      <m:rPr>
+                        <m:nor/>
+                      </m:rPr>
+                      <a:rPr lang="en-GB" sz="1400" i="0">
+                        <a:latin typeface="Bahnschrift" panose="020B0502040204020203" pitchFamily="34" charset="0"/>
+                        <a:ea typeface="Cambria Math" panose="02040503050406030204" pitchFamily="18" charset="0"/>
+                      </a:rPr>
+                      <m:t>=</m:t>
+                    </m:r>
+                    <m:f>
+                      <m:fPr>
+                        <m:ctrlPr>
+                          <a:rPr lang="en-GB" sz="1400" i="1">
+                            <a:latin typeface="Cambria Math" panose="02040503050406030204" pitchFamily="18" charset="0"/>
+                            <a:ea typeface="Cambria Math" panose="02040503050406030204" pitchFamily="18" charset="0"/>
+                          </a:rPr>
+                        </m:ctrlPr>
+                      </m:fPr>
+                      <m:num>
+                        <m:r>
+                          <m:rPr>
+                            <m:nor/>
+                          </m:rPr>
+                          <a:rPr lang="en-GB" sz="1400" i="0">
+                            <a:latin typeface="Bahnschrift" panose="020B0502040204020203" pitchFamily="34" charset="0"/>
+                            <a:ea typeface="Cambria Math" panose="02040503050406030204" pitchFamily="18" charset="0"/>
+                          </a:rPr>
+                          <m:t>4</m:t>
+                        </m:r>
+                      </m:num>
+                      <m:den>
+                        <m:r>
+                          <m:rPr>
+                            <m:nor/>
+                          </m:rPr>
+                          <a:rPr lang="en-GB" sz="1400" i="0">
+                            <a:latin typeface="Bahnschrift" panose="020B0502040204020203" pitchFamily="34" charset="0"/>
+                            <a:ea typeface="Cambria Math" panose="02040503050406030204" pitchFamily="18" charset="0"/>
+                          </a:rPr>
+                          <m:t>60</m:t>
+                        </m:r>
+                      </m:den>
+                    </m:f>
+                  </m:oMath>
+                </a14:m>
+                <a:r>
+                  <a:rPr lang="en-GB" sz="1000" dirty="0">
+                    <a:latin typeface="Bahnschrift" panose="020B0502040204020203" pitchFamily="34" charset="0"/>
+                  </a:rPr>
+                  <a:t> </a:t>
+                </a:r>
+                <a:r>
+                  <a:rPr lang="en-GB" sz="1400" b="1" dirty="0">
+                    <a:latin typeface="Bahnschrift" panose="020B0502040204020203" pitchFamily="34" charset="0"/>
+                  </a:rPr>
+                  <a:t>units</a:t>
+                </a:r>
+                <a:endParaRPr lang="en-GB" sz="1000" b="1" dirty="0">
+                  <a:latin typeface="Bahnschrift" panose="020B0502040204020203" pitchFamily="34" charset="0"/>
+                </a:endParaRPr>
+              </a:p>
+              <a:p>
+                <a:pPr lvl="1"/>
+                <a:r>
+                  <a:rPr lang="en-GB" sz="1400" b="1" dirty="0">
+                    <a:solidFill>
+                      <a:schemeClr val="bg1"/>
+                    </a:solidFill>
+                    <a:latin typeface="Bahnschrift" panose="020B0502040204020203" pitchFamily="34" charset="0"/>
+                  </a:rPr>
+                  <a:t>60FPS:</a:t>
+                </a:r>
+                <a:r>
+                  <a:rPr lang="en-GB" sz="1400" dirty="0">
+                    <a:latin typeface="Bahnschrift" panose="020B0502040204020203" pitchFamily="34" charset="0"/>
+                  </a:rPr>
+                  <a:t> Each second the player moves </a:t>
+                </a:r>
+                <a14:m>
+                  <m:oMath xmlns:m="http://schemas.openxmlformats.org/officeDocument/2006/math">
+                    <m:r>
+                      <m:rPr>
+                        <m:nor/>
+                      </m:rPr>
+                      <a:rPr lang="en-GB" sz="1400" i="0" dirty="0" smtClean="0">
+                        <a:latin typeface="Bahnschrift" panose="020B0502040204020203" pitchFamily="34" charset="0"/>
+                      </a:rPr>
+                      <m:t>6</m:t>
+                    </m:r>
+                    <m:r>
+                      <m:rPr>
+                        <m:nor/>
+                      </m:rPr>
+                      <a:rPr lang="en-GB" sz="1400" b="0" i="0" dirty="0" smtClean="0">
+                        <a:latin typeface="Bahnschrift" panose="020B0502040204020203" pitchFamily="34" charset="0"/>
+                      </a:rPr>
+                      <m:t>0</m:t>
+                    </m:r>
+                    <m:r>
+                      <m:rPr>
+                        <m:nor/>
+                      </m:rPr>
+                      <a:rPr lang="en-GB" sz="1400" i="0">
+                        <a:latin typeface="Bahnschrift" panose="020B0502040204020203" pitchFamily="34" charset="0"/>
+                      </a:rPr>
+                      <m:t> </m:t>
+                    </m:r>
+                    <m:r>
+                      <m:rPr>
+                        <m:nor/>
+                      </m:rPr>
+                      <a:rPr lang="en-GB" sz="1400" i="0">
+                        <a:latin typeface="Bahnschrift" panose="020B0502040204020203" pitchFamily="34" charset="0"/>
+                        <a:ea typeface="Cambria Math" panose="02040503050406030204" pitchFamily="18" charset="0"/>
+                      </a:rPr>
+                      <m:t>×</m:t>
+                    </m:r>
+                    <m:r>
+                      <m:rPr>
+                        <m:nor/>
+                      </m:rPr>
+                      <a:rPr lang="en-GB" sz="1400" i="0">
+                        <a:latin typeface="Bahnschrift" panose="020B0502040204020203" pitchFamily="34" charset="0"/>
+                        <a:ea typeface="Cambria Math" panose="02040503050406030204" pitchFamily="18" charset="0"/>
+                      </a:rPr>
+                      <m:t> </m:t>
+                    </m:r>
+                    <m:f>
+                      <m:fPr>
+                        <m:ctrlPr>
+                          <a:rPr lang="en-GB" sz="1400" i="1">
+                            <a:latin typeface="Cambria Math" panose="02040503050406030204" pitchFamily="18" charset="0"/>
+                            <a:ea typeface="Cambria Math" panose="02040503050406030204" pitchFamily="18" charset="0"/>
+                          </a:rPr>
+                        </m:ctrlPr>
+                      </m:fPr>
+                      <m:num>
+                        <m:r>
+                          <m:rPr>
+                            <m:nor/>
+                          </m:rPr>
+                          <a:rPr lang="en-GB" sz="1400" b="0" i="0" smtClean="0">
+                            <a:latin typeface="Bahnschrift" panose="020B0502040204020203" pitchFamily="34" charset="0"/>
+                            <a:ea typeface="Cambria Math" panose="02040503050406030204" pitchFamily="18" charset="0"/>
+                          </a:rPr>
+                          <m:t>4</m:t>
+                        </m:r>
+                      </m:num>
+                      <m:den>
+                        <m:r>
+                          <m:rPr>
+                            <m:nor/>
+                          </m:rPr>
+                          <a:rPr lang="en-GB" sz="1400" i="0">
+                            <a:latin typeface="Bahnschrift" panose="020B0502040204020203" pitchFamily="34" charset="0"/>
+                            <a:ea typeface="Cambria Math" panose="02040503050406030204" pitchFamily="18" charset="0"/>
+                          </a:rPr>
+                          <m:t>60</m:t>
+                        </m:r>
+                      </m:den>
+                    </m:f>
+                    <m:r>
+                      <m:rPr>
+                        <m:nor/>
+                      </m:rPr>
+                      <a:rPr lang="en-GB" sz="1400" i="0">
+                        <a:latin typeface="Bahnschrift" panose="020B0502040204020203" pitchFamily="34" charset="0"/>
+                        <a:ea typeface="Cambria Math" panose="02040503050406030204" pitchFamily="18" charset="0"/>
+                      </a:rPr>
+                      <m:t>=</m:t>
+                    </m:r>
+                  </m:oMath>
+                </a14:m>
+                <a:r>
+                  <a:rPr lang="en-GB" sz="1400" b="1" dirty="0">
+                    <a:latin typeface="Bahnschrift" panose="020B0502040204020203" pitchFamily="34" charset="0"/>
+                  </a:rPr>
+                  <a:t> </a:t>
+                </a:r>
+                <a:r>
+                  <a:rPr lang="en-GB" sz="1400" b="1" u="sng" dirty="0">
+                    <a:latin typeface="Bahnschrift" panose="020B0502040204020203" pitchFamily="34" charset="0"/>
+                  </a:rPr>
+                  <a:t>4 units </a:t>
+                </a:r>
+              </a:p>
+              <a:p>
+                <a:pPr lvl="1"/>
+                <a:r>
+                  <a:rPr lang="en-GB" sz="1400" b="1" dirty="0">
+                    <a:latin typeface="Bahnschrift" panose="020B0502040204020203" pitchFamily="34" charset="0"/>
+                  </a:rPr>
+                  <a:t>30FPS:</a:t>
+                </a:r>
+                <a:r>
+                  <a:rPr lang="en-GB" sz="1400" dirty="0">
+                    <a:latin typeface="Bahnschrift" panose="020B0502040204020203" pitchFamily="34" charset="0"/>
+                  </a:rPr>
+                  <a:t> Each frame the player moves </a:t>
+                </a:r>
+                <a14:m>
+                  <m:oMath xmlns:m="http://schemas.openxmlformats.org/officeDocument/2006/math">
+                    <m:r>
+                      <m:rPr>
+                        <m:nor/>
+                      </m:rPr>
+                      <a:rPr lang="en-GB" sz="1400" i="0">
+                        <a:latin typeface="Bahnschrift" panose="020B0502040204020203" pitchFamily="34" charset="0"/>
+                      </a:rPr>
+                      <m:t>4 </m:t>
+                    </m:r>
+                    <m:r>
+                      <m:rPr>
+                        <m:nor/>
+                      </m:rPr>
+                      <a:rPr lang="en-GB" sz="1400" i="0">
+                        <a:latin typeface="Bahnschrift" panose="020B0502040204020203" pitchFamily="34" charset="0"/>
+                        <a:ea typeface="Cambria Math" panose="02040503050406030204" pitchFamily="18" charset="0"/>
+                      </a:rPr>
+                      <m:t>×</m:t>
+                    </m:r>
+                    <m:r>
+                      <m:rPr>
+                        <m:nor/>
+                      </m:rPr>
+                      <a:rPr lang="en-GB" sz="1400" i="0">
+                        <a:latin typeface="Bahnschrift" panose="020B0502040204020203" pitchFamily="34" charset="0"/>
+                        <a:ea typeface="Cambria Math" panose="02040503050406030204" pitchFamily="18" charset="0"/>
+                      </a:rPr>
+                      <m:t> </m:t>
+                    </m:r>
+                    <m:f>
+                      <m:fPr>
+                        <m:ctrlPr>
+                          <a:rPr lang="en-GB" sz="1400" i="1">
+                            <a:latin typeface="Cambria Math" panose="02040503050406030204" pitchFamily="18" charset="0"/>
+                            <a:ea typeface="Cambria Math" panose="02040503050406030204" pitchFamily="18" charset="0"/>
+                          </a:rPr>
+                        </m:ctrlPr>
+                      </m:fPr>
+                      <m:num>
+                        <m:r>
+                          <m:rPr>
+                            <m:nor/>
+                          </m:rPr>
+                          <a:rPr lang="en-GB" sz="1400" i="0">
+                            <a:latin typeface="Bahnschrift" panose="020B0502040204020203" pitchFamily="34" charset="0"/>
+                            <a:ea typeface="Cambria Math" panose="02040503050406030204" pitchFamily="18" charset="0"/>
+                          </a:rPr>
+                          <m:t>1</m:t>
+                        </m:r>
+                      </m:num>
+                      <m:den>
+                        <m:r>
+                          <m:rPr>
+                            <m:nor/>
+                          </m:rPr>
+                          <a:rPr lang="en-GB" sz="1400" b="0" i="0" smtClean="0">
+                            <a:latin typeface="Bahnschrift" panose="020B0502040204020203" pitchFamily="34" charset="0"/>
+                            <a:ea typeface="Cambria Math" panose="02040503050406030204" pitchFamily="18" charset="0"/>
+                          </a:rPr>
+                          <m:t>3</m:t>
+                        </m:r>
+                        <m:r>
+                          <m:rPr>
+                            <m:nor/>
+                          </m:rPr>
+                          <a:rPr lang="en-GB" sz="1400" i="0">
+                            <a:latin typeface="Bahnschrift" panose="020B0502040204020203" pitchFamily="34" charset="0"/>
+                            <a:ea typeface="Cambria Math" panose="02040503050406030204" pitchFamily="18" charset="0"/>
+                          </a:rPr>
+                          <m:t>0</m:t>
+                        </m:r>
+                      </m:den>
+                    </m:f>
+                    <m:r>
+                      <m:rPr>
+                        <m:nor/>
+                      </m:rPr>
+                      <a:rPr lang="en-GB" sz="1400" i="0">
+                        <a:latin typeface="Bahnschrift" panose="020B0502040204020203" pitchFamily="34" charset="0"/>
+                        <a:ea typeface="Cambria Math" panose="02040503050406030204" pitchFamily="18" charset="0"/>
+                      </a:rPr>
+                      <m:t>=</m:t>
+                    </m:r>
+                    <m:f>
+                      <m:fPr>
+                        <m:ctrlPr>
+                          <a:rPr lang="en-GB" sz="1400" i="1">
+                            <a:latin typeface="Cambria Math" panose="02040503050406030204" pitchFamily="18" charset="0"/>
+                            <a:ea typeface="Cambria Math" panose="02040503050406030204" pitchFamily="18" charset="0"/>
+                          </a:rPr>
+                        </m:ctrlPr>
+                      </m:fPr>
+                      <m:num>
+                        <m:r>
+                          <m:rPr>
+                            <m:nor/>
+                          </m:rPr>
+                          <a:rPr lang="en-GB" sz="1400" i="0">
+                            <a:latin typeface="Bahnschrift" panose="020B0502040204020203" pitchFamily="34" charset="0"/>
+                            <a:ea typeface="Cambria Math" panose="02040503050406030204" pitchFamily="18" charset="0"/>
+                          </a:rPr>
+                          <m:t>4</m:t>
+                        </m:r>
+                      </m:num>
+                      <m:den>
+                        <m:r>
+                          <m:rPr>
+                            <m:nor/>
+                          </m:rPr>
+                          <a:rPr lang="en-GB" sz="1400" b="0" i="0" smtClean="0">
+                            <a:latin typeface="Bahnschrift" panose="020B0502040204020203" pitchFamily="34" charset="0"/>
+                            <a:ea typeface="Cambria Math" panose="02040503050406030204" pitchFamily="18" charset="0"/>
+                          </a:rPr>
+                          <m:t>3</m:t>
+                        </m:r>
+                        <m:r>
+                          <m:rPr>
+                            <m:nor/>
+                          </m:rPr>
+                          <a:rPr lang="en-GB" sz="1400" i="0">
+                            <a:latin typeface="Bahnschrift" panose="020B0502040204020203" pitchFamily="34" charset="0"/>
+                            <a:ea typeface="Cambria Math" panose="02040503050406030204" pitchFamily="18" charset="0"/>
+                          </a:rPr>
+                          <m:t>0</m:t>
+                        </m:r>
+                      </m:den>
+                    </m:f>
+                  </m:oMath>
+                </a14:m>
+                <a:r>
+                  <a:rPr lang="en-GB" sz="1000" dirty="0">
+                    <a:latin typeface="Bahnschrift" panose="020B0502040204020203" pitchFamily="34" charset="0"/>
+                  </a:rPr>
+                  <a:t> </a:t>
+                </a:r>
+                <a:r>
+                  <a:rPr lang="en-GB" sz="1400" b="1" dirty="0">
+                    <a:latin typeface="Bahnschrift" panose="020B0502040204020203" pitchFamily="34" charset="0"/>
+                  </a:rPr>
+                  <a:t>units</a:t>
+                </a:r>
+                <a:endParaRPr lang="en-GB" sz="1000" b="1" dirty="0">
+                  <a:latin typeface="Bahnschrift" panose="020B0502040204020203" pitchFamily="34" charset="0"/>
+                </a:endParaRPr>
+              </a:p>
+              <a:p>
+                <a:pPr lvl="1"/>
+                <a:r>
+                  <a:rPr lang="en-GB" sz="1400" dirty="0">
+                    <a:solidFill>
+                      <a:schemeClr val="bg1"/>
+                    </a:solidFill>
+                    <a:latin typeface="Bahnschrift" panose="020B0502040204020203" pitchFamily="34" charset="0"/>
+                  </a:rPr>
+                  <a:t>30FPS:</a:t>
+                </a:r>
+                <a:r>
+                  <a:rPr lang="en-GB" sz="1400" dirty="0">
+                    <a:latin typeface="Bahnschrift" panose="020B0502040204020203" pitchFamily="34" charset="0"/>
+                  </a:rPr>
+                  <a:t> Each second the player moves </a:t>
+                </a:r>
+                <a14:m>
+                  <m:oMath xmlns:m="http://schemas.openxmlformats.org/officeDocument/2006/math">
+                    <m:r>
+                      <m:rPr>
+                        <m:nor/>
+                      </m:rPr>
+                      <a:rPr lang="en-GB" sz="1400" b="0" i="0" smtClean="0">
+                        <a:latin typeface="Bahnschrift" panose="020B0502040204020203" pitchFamily="34" charset="0"/>
+                      </a:rPr>
+                      <m:t>30</m:t>
+                    </m:r>
+                    <m:r>
+                      <m:rPr>
+                        <m:nor/>
+                      </m:rPr>
+                      <a:rPr lang="en-GB" sz="1400" i="0">
+                        <a:latin typeface="Bahnschrift" panose="020B0502040204020203" pitchFamily="34" charset="0"/>
+                      </a:rPr>
+                      <m:t> </m:t>
+                    </m:r>
+                    <m:r>
+                      <m:rPr>
+                        <m:nor/>
+                      </m:rPr>
+                      <a:rPr lang="en-GB" sz="1400" i="0">
+                        <a:latin typeface="Bahnschrift" panose="020B0502040204020203" pitchFamily="34" charset="0"/>
+                        <a:ea typeface="Cambria Math" panose="02040503050406030204" pitchFamily="18" charset="0"/>
+                      </a:rPr>
+                      <m:t>×</m:t>
+                    </m:r>
+                    <m:r>
+                      <m:rPr>
+                        <m:nor/>
+                      </m:rPr>
+                      <a:rPr lang="en-GB" sz="1400" i="0">
+                        <a:latin typeface="Bahnschrift" panose="020B0502040204020203" pitchFamily="34" charset="0"/>
+                        <a:ea typeface="Cambria Math" panose="02040503050406030204" pitchFamily="18" charset="0"/>
+                      </a:rPr>
+                      <m:t> </m:t>
+                    </m:r>
+                    <m:f>
+                      <m:fPr>
+                        <m:ctrlPr>
+                          <a:rPr lang="en-GB" sz="1400" i="1">
+                            <a:latin typeface="Cambria Math" panose="02040503050406030204" pitchFamily="18" charset="0"/>
+                            <a:ea typeface="Cambria Math" panose="02040503050406030204" pitchFamily="18" charset="0"/>
+                          </a:rPr>
+                        </m:ctrlPr>
+                      </m:fPr>
+                      <m:num>
+                        <m:r>
+                          <m:rPr>
+                            <m:nor/>
+                          </m:rPr>
+                          <a:rPr lang="en-GB" sz="1400" b="0" i="0" smtClean="0">
+                            <a:latin typeface="Bahnschrift" panose="020B0502040204020203" pitchFamily="34" charset="0"/>
+                            <a:ea typeface="Cambria Math" panose="02040503050406030204" pitchFamily="18" charset="0"/>
+                          </a:rPr>
+                          <m:t>4</m:t>
+                        </m:r>
+                      </m:num>
+                      <m:den>
+                        <m:r>
+                          <m:rPr>
+                            <m:nor/>
+                          </m:rPr>
+                          <a:rPr lang="en-GB" sz="1400" i="0">
+                            <a:latin typeface="Bahnschrift" panose="020B0502040204020203" pitchFamily="34" charset="0"/>
+                            <a:ea typeface="Cambria Math" panose="02040503050406030204" pitchFamily="18" charset="0"/>
+                          </a:rPr>
+                          <m:t>3</m:t>
+                        </m:r>
+                        <m:r>
+                          <m:rPr>
+                            <m:nor/>
+                          </m:rPr>
+                          <a:rPr lang="en-GB" sz="1400" i="0">
+                            <a:latin typeface="Bahnschrift" panose="020B0502040204020203" pitchFamily="34" charset="0"/>
+                            <a:ea typeface="Cambria Math" panose="02040503050406030204" pitchFamily="18" charset="0"/>
+                          </a:rPr>
+                          <m:t>0</m:t>
+                        </m:r>
+                      </m:den>
+                    </m:f>
+                    <m:r>
+                      <m:rPr>
+                        <m:nor/>
+                      </m:rPr>
+                      <a:rPr lang="en-GB" sz="1400" i="0" smtClean="0">
+                        <a:latin typeface="Bahnschrift" panose="020B0502040204020203" pitchFamily="34" charset="0"/>
+                        <a:ea typeface="Cambria Math" panose="02040503050406030204" pitchFamily="18" charset="0"/>
+                      </a:rPr>
+                      <m:t>=</m:t>
+                    </m:r>
+                  </m:oMath>
+                </a14:m>
+                <a:r>
+                  <a:rPr lang="en-GB" sz="1000" dirty="0">
+                    <a:latin typeface="Bahnschrift" panose="020B0502040204020203" pitchFamily="34" charset="0"/>
+                  </a:rPr>
+                  <a:t> </a:t>
+                </a:r>
+                <a:r>
+                  <a:rPr lang="en-GB" sz="1400" b="1" u="sng" dirty="0">
+                    <a:latin typeface="Bahnschrift" panose="020B0502040204020203" pitchFamily="34" charset="0"/>
+                  </a:rPr>
+                  <a:t>4 units</a:t>
+                </a:r>
+              </a:p>
+              <a:p>
+                <a:pPr lvl="1"/>
+                <a:r>
+                  <a:rPr lang="en-GB" sz="1400" dirty="0">
+                    <a:latin typeface="Bahnschrift" panose="020B0502040204020203" pitchFamily="34" charset="0"/>
+                  </a:rPr>
+                  <a:t>Much better!</a:t>
+                </a:r>
+              </a:p>
+              <a:p>
+                <a:r>
+                  <a:rPr lang="en-GB" sz="1800" dirty="0">
+                    <a:latin typeface="Bahnschrift" panose="020B0502040204020203" pitchFamily="34" charset="0"/>
+                  </a:rPr>
+                  <a:t>Note: With this implemented, you’ll probably need to increase your</a:t>
+                </a:r>
+                <a:br>
+                  <a:rPr lang="en-GB" sz="1800" dirty="0">
+                    <a:latin typeface="Bahnschrift" panose="020B0502040204020203" pitchFamily="34" charset="0"/>
+                  </a:rPr>
+                </a:br>
+                <a:r>
+                  <a:rPr lang="en-GB" sz="1800" dirty="0">
+                    <a:latin typeface="Bahnschrift" panose="020B0502040204020203" pitchFamily="34" charset="0"/>
+                  </a:rPr>
+                  <a:t>          speed variable</a:t>
+                </a:r>
+              </a:p>
+            </p:txBody>
+          </p:sp>
+        </mc:Choice>
+        <mc:Fallback>
+          <p:sp>
+            <p:nvSpPr>
+              <p:cNvPr id="3" name="Content Placeholder 2">
+                <a:extLst>
+                  <a:ext uri="{FF2B5EF4-FFF2-40B4-BE49-F238E27FC236}">
+                    <a16:creationId xmlns:a16="http://schemas.microsoft.com/office/drawing/2014/main" id="{18999FBF-B204-4B93-939E-906097ADC133}"/>
+                  </a:ext>
+                </a:extLst>
+              </p:cNvPr>
+              <p:cNvSpPr>
+                <a:spLocks noGrp="1" noRot="1" noChangeAspect="1" noMove="1" noResize="1" noEditPoints="1" noAdjustHandles="1" noChangeArrowheads="1" noChangeShapeType="1" noTextEdit="1"/>
+              </p:cNvSpPr>
+              <p:nvPr>
+                <p:ph idx="1"/>
+              </p:nvPr>
+            </p:nvSpPr>
+            <p:spPr>
+              <a:xfrm>
+                <a:off x="1136429" y="2278174"/>
+                <a:ext cx="7474171" cy="4500132"/>
+              </a:xfrm>
+              <a:blipFill>
+                <a:blip r:embed="rId2"/>
+                <a:stretch>
+                  <a:fillRect l="-489" t="-2033"/>
+                </a:stretch>
+              </a:blipFill>
+            </p:spPr>
+            <p:txBody>
+              <a:bodyPr/>
+              <a:lstStyle/>
+              <a:p>
+                <a:r>
+                  <a:rPr lang="en-GB">
+                    <a:noFill/>
+                  </a:rPr>
+                  <a:t> </a:t>
+                </a:r>
+              </a:p>
+            </p:txBody>
+          </p:sp>
+        </mc:Fallback>
+      </mc:AlternateContent>
       <p:pic>
         <p:nvPicPr>
           <p:cNvPr id="10" name="Picture 2">
@@ -11582,7 +12110,7 @@
           <p:nvPr/>
         </p:nvPicPr>
         <p:blipFill>
-          <a:blip r:embed="rId2" cstate="hqprint">
+          <a:blip r:embed="rId3" cstate="hqprint">
             <a:extLst>
               <a:ext uri="{28A0092B-C50C-407E-A947-70E740481C1C}">
                 <a14:useLocalDpi xmlns:a14="http://schemas.microsoft.com/office/drawing/2010/main" val="0"/>
@@ -11982,564 +12510,6 @@
           </a:p>
         </p:txBody>
       </p:sp>
-      <p:grpSp>
-        <p:nvGrpSpPr>
-          <p:cNvPr id="16" name="Group 15">
-            <a:extLst>
-              <a:ext uri="{FF2B5EF4-FFF2-40B4-BE49-F238E27FC236}">
-                <a16:creationId xmlns:a16="http://schemas.microsoft.com/office/drawing/2014/main" id="{FC2CC018-5D46-419C-BF28-421BE91FBE5D}"/>
-              </a:ext>
-            </a:extLst>
-          </p:cNvPr>
-          <p:cNvGrpSpPr/>
-          <p:nvPr/>
-        </p:nvGrpSpPr>
-        <p:grpSpPr>
-          <a:xfrm>
-            <a:off x="3932119" y="2882160"/>
-            <a:ext cx="436228" cy="589327"/>
-            <a:chOff x="4085438" y="3134336"/>
-            <a:chExt cx="436228" cy="589327"/>
-          </a:xfrm>
-        </p:grpSpPr>
-        <p:sp>
-          <p:nvSpPr>
-            <p:cNvPr id="13" name="Content Placeholder 2">
-              <a:extLst>
-                <a:ext uri="{FF2B5EF4-FFF2-40B4-BE49-F238E27FC236}">
-                  <a16:creationId xmlns:a16="http://schemas.microsoft.com/office/drawing/2014/main" id="{359CB3BE-052A-463B-BD95-6A844771F29F}"/>
-                </a:ext>
-              </a:extLst>
-            </p:cNvPr>
-            <p:cNvSpPr txBox="1">
-              <a:spLocks/>
-            </p:cNvSpPr>
-            <p:nvPr/>
-          </p:nvSpPr>
-          <p:spPr>
-            <a:xfrm>
-              <a:off x="4085438" y="3134336"/>
-              <a:ext cx="436228" cy="589327"/>
-            </a:xfrm>
-            <a:prstGeom prst="rect">
-              <a:avLst/>
-            </a:prstGeom>
-          </p:spPr>
-          <p:txBody>
-            <a:bodyPr vert="horz" lIns="91440" tIns="45720" rIns="91440" bIns="45720" rtlCol="0" anchor="t">
-              <a:normAutofit/>
-            </a:bodyPr>
-            <a:lstStyle>
-              <a:lvl1pPr marL="228600" indent="-228600" algn="l" defTabSz="914400" rtl="0" eaLnBrk="1" latinLnBrk="0" hangingPunct="1">
-                <a:lnSpc>
-                  <a:spcPct val="90000"/>
-                </a:lnSpc>
-                <a:spcBef>
-                  <a:spcPts val="1000"/>
-                </a:spcBef>
-                <a:buFont typeface="Arial" panose="020B0604020202020204" pitchFamily="34" charset="0"/>
-                <a:buChar char="•"/>
-                <a:defRPr sz="2800" kern="1200">
-                  <a:solidFill>
-                    <a:schemeClr val="tx1"/>
-                  </a:solidFill>
-                  <a:latin typeface="+mn-lt"/>
-                  <a:ea typeface="+mn-ea"/>
-                  <a:cs typeface="+mn-cs"/>
-                </a:defRPr>
-              </a:lvl1pPr>
-              <a:lvl2pPr marL="685800" indent="-228600" algn="l" defTabSz="914400" rtl="0" eaLnBrk="1" latinLnBrk="0" hangingPunct="1">
-                <a:lnSpc>
-                  <a:spcPct val="90000"/>
-                </a:lnSpc>
-                <a:spcBef>
-                  <a:spcPts val="500"/>
-                </a:spcBef>
-                <a:buFont typeface="Arial" panose="020B0604020202020204" pitchFamily="34" charset="0"/>
-                <a:buChar char="•"/>
-                <a:defRPr sz="2400" kern="1200">
-                  <a:solidFill>
-                    <a:schemeClr val="tx1"/>
-                  </a:solidFill>
-                  <a:latin typeface="+mn-lt"/>
-                  <a:ea typeface="+mn-ea"/>
-                  <a:cs typeface="+mn-cs"/>
-                </a:defRPr>
-              </a:lvl2pPr>
-              <a:lvl3pPr marL="1143000" indent="-228600" algn="l" defTabSz="914400" rtl="0" eaLnBrk="1" latinLnBrk="0" hangingPunct="1">
-                <a:lnSpc>
-                  <a:spcPct val="90000"/>
-                </a:lnSpc>
-                <a:spcBef>
-                  <a:spcPts val="500"/>
-                </a:spcBef>
-                <a:buFont typeface="Arial" panose="020B0604020202020204" pitchFamily="34" charset="0"/>
-                <a:buChar char="•"/>
-                <a:defRPr sz="2000" kern="1200">
-                  <a:solidFill>
-                    <a:schemeClr val="tx1"/>
-                  </a:solidFill>
-                  <a:latin typeface="+mn-lt"/>
-                  <a:ea typeface="+mn-ea"/>
-                  <a:cs typeface="+mn-cs"/>
-                </a:defRPr>
-              </a:lvl3pPr>
-              <a:lvl4pPr marL="1600200" indent="-228600" algn="l" defTabSz="914400" rtl="0" eaLnBrk="1" latinLnBrk="0" hangingPunct="1">
-                <a:lnSpc>
-                  <a:spcPct val="90000"/>
-                </a:lnSpc>
-                <a:spcBef>
-                  <a:spcPts val="500"/>
-                </a:spcBef>
-                <a:buFont typeface="Arial" panose="020B0604020202020204" pitchFamily="34" charset="0"/>
-                <a:buChar char="•"/>
-                <a:defRPr sz="1800" kern="1200">
-                  <a:solidFill>
-                    <a:schemeClr val="tx1"/>
-                  </a:solidFill>
-                  <a:latin typeface="+mn-lt"/>
-                  <a:ea typeface="+mn-ea"/>
-                  <a:cs typeface="+mn-cs"/>
-                </a:defRPr>
-              </a:lvl4pPr>
-              <a:lvl5pPr marL="2057400" indent="-228600" algn="l" defTabSz="914400" rtl="0" eaLnBrk="1" latinLnBrk="0" hangingPunct="1">
-                <a:lnSpc>
-                  <a:spcPct val="90000"/>
-                </a:lnSpc>
-                <a:spcBef>
-                  <a:spcPts val="500"/>
-                </a:spcBef>
-                <a:buFont typeface="Arial" panose="020B0604020202020204" pitchFamily="34" charset="0"/>
-                <a:buChar char="•"/>
-                <a:defRPr sz="1800" kern="1200">
-                  <a:solidFill>
-                    <a:schemeClr val="tx1"/>
-                  </a:solidFill>
-                  <a:latin typeface="+mn-lt"/>
-                  <a:ea typeface="+mn-ea"/>
-                  <a:cs typeface="+mn-cs"/>
-                </a:defRPr>
-              </a:lvl5pPr>
-              <a:lvl6pPr marL="2514600" indent="-228600" algn="l" defTabSz="914400" rtl="0" eaLnBrk="1" latinLnBrk="0" hangingPunct="1">
-                <a:lnSpc>
-                  <a:spcPct val="90000"/>
-                </a:lnSpc>
-                <a:spcBef>
-                  <a:spcPts val="500"/>
-                </a:spcBef>
-                <a:buFont typeface="Arial" panose="020B0604020202020204" pitchFamily="34" charset="0"/>
-                <a:buChar char="•"/>
-                <a:defRPr sz="1800" kern="1200">
-                  <a:solidFill>
-                    <a:schemeClr val="tx1"/>
-                  </a:solidFill>
-                  <a:latin typeface="+mn-lt"/>
-                  <a:ea typeface="+mn-ea"/>
-                  <a:cs typeface="+mn-cs"/>
-                </a:defRPr>
-              </a:lvl6pPr>
-              <a:lvl7pPr marL="2971800" indent="-228600" algn="l" defTabSz="914400" rtl="0" eaLnBrk="1" latinLnBrk="0" hangingPunct="1">
-                <a:lnSpc>
-                  <a:spcPct val="90000"/>
-                </a:lnSpc>
-                <a:spcBef>
-                  <a:spcPts val="500"/>
-                </a:spcBef>
-                <a:buFont typeface="Arial" panose="020B0604020202020204" pitchFamily="34" charset="0"/>
-                <a:buChar char="•"/>
-                <a:defRPr sz="1800" kern="1200">
-                  <a:solidFill>
-                    <a:schemeClr val="tx1"/>
-                  </a:solidFill>
-                  <a:latin typeface="+mn-lt"/>
-                  <a:ea typeface="+mn-ea"/>
-                  <a:cs typeface="+mn-cs"/>
-                </a:defRPr>
-              </a:lvl7pPr>
-              <a:lvl8pPr marL="3429000" indent="-228600" algn="l" defTabSz="914400" rtl="0" eaLnBrk="1" latinLnBrk="0" hangingPunct="1">
-                <a:lnSpc>
-                  <a:spcPct val="90000"/>
-                </a:lnSpc>
-                <a:spcBef>
-                  <a:spcPts val="500"/>
-                </a:spcBef>
-                <a:buFont typeface="Arial" panose="020B0604020202020204" pitchFamily="34" charset="0"/>
-                <a:buChar char="•"/>
-                <a:defRPr sz="1800" kern="1200">
-                  <a:solidFill>
-                    <a:schemeClr val="tx1"/>
-                  </a:solidFill>
-                  <a:latin typeface="+mn-lt"/>
-                  <a:ea typeface="+mn-ea"/>
-                  <a:cs typeface="+mn-cs"/>
-                </a:defRPr>
-              </a:lvl8pPr>
-              <a:lvl9pPr marL="3886200" indent="-228600" algn="l" defTabSz="914400" rtl="0" eaLnBrk="1" latinLnBrk="0" hangingPunct="1">
-                <a:lnSpc>
-                  <a:spcPct val="90000"/>
-                </a:lnSpc>
-                <a:spcBef>
-                  <a:spcPts val="500"/>
-                </a:spcBef>
-                <a:buFont typeface="Arial" panose="020B0604020202020204" pitchFamily="34" charset="0"/>
-                <a:buChar char="•"/>
-                <a:defRPr sz="1800" kern="1200">
-                  <a:solidFill>
-                    <a:schemeClr val="tx1"/>
-                  </a:solidFill>
-                  <a:latin typeface="+mn-lt"/>
-                  <a:ea typeface="+mn-ea"/>
-                  <a:cs typeface="+mn-cs"/>
-                </a:defRPr>
-              </a:lvl9pPr>
-            </a:lstStyle>
-            <a:p>
-              <a:pPr marL="0" indent="0" algn="ctr">
-                <a:buNone/>
-              </a:pPr>
-              <a:r>
-                <a:rPr lang="en-GB" sz="1000" dirty="0">
-                  <a:latin typeface="Bahnschrift" panose="020B0502040204020203" pitchFamily="34" charset="0"/>
-                </a:rPr>
-                <a:t>1</a:t>
-              </a:r>
-              <a:br>
-                <a:rPr lang="en-GB" sz="1000" dirty="0">
-                  <a:latin typeface="Bahnschrift" panose="020B0502040204020203" pitchFamily="34" charset="0"/>
-                </a:rPr>
-              </a:br>
-              <a:r>
-                <a:rPr lang="en-GB" sz="1000" dirty="0">
-                  <a:latin typeface="Bahnschrift" panose="020B0502040204020203" pitchFamily="34" charset="0"/>
-                </a:rPr>
-                <a:t>60</a:t>
-              </a:r>
-            </a:p>
-          </p:txBody>
-        </p:sp>
-        <p:cxnSp>
-          <p:nvCxnSpPr>
-            <p:cNvPr id="11" name="Straight Connector 10">
-              <a:extLst>
-                <a:ext uri="{FF2B5EF4-FFF2-40B4-BE49-F238E27FC236}">
-                  <a16:creationId xmlns:a16="http://schemas.microsoft.com/office/drawing/2014/main" id="{BD83B69F-C519-431B-8E32-0E4D0675BA00}"/>
-                </a:ext>
-              </a:extLst>
-            </p:cNvPr>
-            <p:cNvCxnSpPr>
-              <a:cxnSpLocks/>
-            </p:cNvCxnSpPr>
-            <p:nvPr/>
-          </p:nvCxnSpPr>
-          <p:spPr>
-            <a:xfrm flipH="1">
-              <a:off x="4236441" y="3320991"/>
-              <a:ext cx="144000" cy="0"/>
-            </a:xfrm>
-            <a:prstGeom prst="line">
-              <a:avLst/>
-            </a:prstGeom>
-            <a:ln w="12700">
-              <a:solidFill>
-                <a:srgbClr val="3F3F3F"/>
-              </a:solidFill>
-            </a:ln>
-          </p:spPr>
-          <p:style>
-            <a:lnRef idx="1">
-              <a:schemeClr val="accent1"/>
-            </a:lnRef>
-            <a:fillRef idx="0">
-              <a:schemeClr val="accent1"/>
-            </a:fillRef>
-            <a:effectRef idx="0">
-              <a:schemeClr val="accent1"/>
-            </a:effectRef>
-            <a:fontRef idx="minor">
-              <a:schemeClr val="tx1"/>
-            </a:fontRef>
-          </p:style>
-        </p:cxnSp>
-      </p:grpSp>
-      <p:grpSp>
-        <p:nvGrpSpPr>
-          <p:cNvPr id="17" name="Group 16">
-            <a:extLst>
-              <a:ext uri="{FF2B5EF4-FFF2-40B4-BE49-F238E27FC236}">
-                <a16:creationId xmlns:a16="http://schemas.microsoft.com/office/drawing/2014/main" id="{2F60BD94-5C7C-4B7E-82E0-3712B48C4A09}"/>
-              </a:ext>
-            </a:extLst>
-          </p:cNvPr>
-          <p:cNvGrpSpPr/>
-          <p:nvPr/>
-        </p:nvGrpSpPr>
-        <p:grpSpPr>
-          <a:xfrm>
-            <a:off x="3932121" y="3501869"/>
-            <a:ext cx="436228" cy="589327"/>
-            <a:chOff x="4085438" y="3134336"/>
-            <a:chExt cx="436228" cy="589327"/>
-          </a:xfrm>
-        </p:grpSpPr>
-        <p:sp>
-          <p:nvSpPr>
-            <p:cNvPr id="18" name="Content Placeholder 2">
-              <a:extLst>
-                <a:ext uri="{FF2B5EF4-FFF2-40B4-BE49-F238E27FC236}">
-                  <a16:creationId xmlns:a16="http://schemas.microsoft.com/office/drawing/2014/main" id="{A77B8904-ABEA-4482-84D4-260BC988241E}"/>
-                </a:ext>
-              </a:extLst>
-            </p:cNvPr>
-            <p:cNvSpPr txBox="1">
-              <a:spLocks/>
-            </p:cNvSpPr>
-            <p:nvPr/>
-          </p:nvSpPr>
-          <p:spPr>
-            <a:xfrm>
-              <a:off x="4085438" y="3134336"/>
-              <a:ext cx="436228" cy="589327"/>
-            </a:xfrm>
-            <a:prstGeom prst="rect">
-              <a:avLst/>
-            </a:prstGeom>
-          </p:spPr>
-          <p:txBody>
-            <a:bodyPr vert="horz" lIns="91440" tIns="45720" rIns="91440" bIns="45720" rtlCol="0" anchor="t">
-              <a:normAutofit/>
-            </a:bodyPr>
-            <a:lstStyle>
-              <a:lvl1pPr marL="228600" indent="-228600" algn="l" defTabSz="914400" rtl="0" eaLnBrk="1" latinLnBrk="0" hangingPunct="1">
-                <a:lnSpc>
-                  <a:spcPct val="90000"/>
-                </a:lnSpc>
-                <a:spcBef>
-                  <a:spcPts val="1000"/>
-                </a:spcBef>
-                <a:buFont typeface="Arial" panose="020B0604020202020204" pitchFamily="34" charset="0"/>
-                <a:buChar char="•"/>
-                <a:defRPr sz="2800" kern="1200">
-                  <a:solidFill>
-                    <a:schemeClr val="tx1"/>
-                  </a:solidFill>
-                  <a:latin typeface="+mn-lt"/>
-                  <a:ea typeface="+mn-ea"/>
-                  <a:cs typeface="+mn-cs"/>
-                </a:defRPr>
-              </a:lvl1pPr>
-              <a:lvl2pPr marL="685800" indent="-228600" algn="l" defTabSz="914400" rtl="0" eaLnBrk="1" latinLnBrk="0" hangingPunct="1">
-                <a:lnSpc>
-                  <a:spcPct val="90000"/>
-                </a:lnSpc>
-                <a:spcBef>
-                  <a:spcPts val="500"/>
-                </a:spcBef>
-                <a:buFont typeface="Arial" panose="020B0604020202020204" pitchFamily="34" charset="0"/>
-                <a:buChar char="•"/>
-                <a:defRPr sz="2400" kern="1200">
-                  <a:solidFill>
-                    <a:schemeClr val="tx1"/>
-                  </a:solidFill>
-                  <a:latin typeface="+mn-lt"/>
-                  <a:ea typeface="+mn-ea"/>
-                  <a:cs typeface="+mn-cs"/>
-                </a:defRPr>
-              </a:lvl2pPr>
-              <a:lvl3pPr marL="1143000" indent="-228600" algn="l" defTabSz="914400" rtl="0" eaLnBrk="1" latinLnBrk="0" hangingPunct="1">
-                <a:lnSpc>
-                  <a:spcPct val="90000"/>
-                </a:lnSpc>
-                <a:spcBef>
-                  <a:spcPts val="500"/>
-                </a:spcBef>
-                <a:buFont typeface="Arial" panose="020B0604020202020204" pitchFamily="34" charset="0"/>
-                <a:buChar char="•"/>
-                <a:defRPr sz="2000" kern="1200">
-                  <a:solidFill>
-                    <a:schemeClr val="tx1"/>
-                  </a:solidFill>
-                  <a:latin typeface="+mn-lt"/>
-                  <a:ea typeface="+mn-ea"/>
-                  <a:cs typeface="+mn-cs"/>
-                </a:defRPr>
-              </a:lvl3pPr>
-              <a:lvl4pPr marL="1600200" indent="-228600" algn="l" defTabSz="914400" rtl="0" eaLnBrk="1" latinLnBrk="0" hangingPunct="1">
-                <a:lnSpc>
-                  <a:spcPct val="90000"/>
-                </a:lnSpc>
-                <a:spcBef>
-                  <a:spcPts val="500"/>
-                </a:spcBef>
-                <a:buFont typeface="Arial" panose="020B0604020202020204" pitchFamily="34" charset="0"/>
-                <a:buChar char="•"/>
-                <a:defRPr sz="1800" kern="1200">
-                  <a:solidFill>
-                    <a:schemeClr val="tx1"/>
-                  </a:solidFill>
-                  <a:latin typeface="+mn-lt"/>
-                  <a:ea typeface="+mn-ea"/>
-                  <a:cs typeface="+mn-cs"/>
-                </a:defRPr>
-              </a:lvl4pPr>
-              <a:lvl5pPr marL="2057400" indent="-228600" algn="l" defTabSz="914400" rtl="0" eaLnBrk="1" latinLnBrk="0" hangingPunct="1">
-                <a:lnSpc>
-                  <a:spcPct val="90000"/>
-                </a:lnSpc>
-                <a:spcBef>
-                  <a:spcPts val="500"/>
-                </a:spcBef>
-                <a:buFont typeface="Arial" panose="020B0604020202020204" pitchFamily="34" charset="0"/>
-                <a:buChar char="•"/>
-                <a:defRPr sz="1800" kern="1200">
-                  <a:solidFill>
-                    <a:schemeClr val="tx1"/>
-                  </a:solidFill>
-                  <a:latin typeface="+mn-lt"/>
-                  <a:ea typeface="+mn-ea"/>
-                  <a:cs typeface="+mn-cs"/>
-                </a:defRPr>
-              </a:lvl5pPr>
-              <a:lvl6pPr marL="2514600" indent="-228600" algn="l" defTabSz="914400" rtl="0" eaLnBrk="1" latinLnBrk="0" hangingPunct="1">
-                <a:lnSpc>
-                  <a:spcPct val="90000"/>
-                </a:lnSpc>
-                <a:spcBef>
-                  <a:spcPts val="500"/>
-                </a:spcBef>
-                <a:buFont typeface="Arial" panose="020B0604020202020204" pitchFamily="34" charset="0"/>
-                <a:buChar char="•"/>
-                <a:defRPr sz="1800" kern="1200">
-                  <a:solidFill>
-                    <a:schemeClr val="tx1"/>
-                  </a:solidFill>
-                  <a:latin typeface="+mn-lt"/>
-                  <a:ea typeface="+mn-ea"/>
-                  <a:cs typeface="+mn-cs"/>
-                </a:defRPr>
-              </a:lvl6pPr>
-              <a:lvl7pPr marL="2971800" indent="-228600" algn="l" defTabSz="914400" rtl="0" eaLnBrk="1" latinLnBrk="0" hangingPunct="1">
-                <a:lnSpc>
-                  <a:spcPct val="90000"/>
-                </a:lnSpc>
-                <a:spcBef>
-                  <a:spcPts val="500"/>
-                </a:spcBef>
-                <a:buFont typeface="Arial" panose="020B0604020202020204" pitchFamily="34" charset="0"/>
-                <a:buChar char="•"/>
-                <a:defRPr sz="1800" kern="1200">
-                  <a:solidFill>
-                    <a:schemeClr val="tx1"/>
-                  </a:solidFill>
-                  <a:latin typeface="+mn-lt"/>
-                  <a:ea typeface="+mn-ea"/>
-                  <a:cs typeface="+mn-cs"/>
-                </a:defRPr>
-              </a:lvl7pPr>
-              <a:lvl8pPr marL="3429000" indent="-228600" algn="l" defTabSz="914400" rtl="0" eaLnBrk="1" latinLnBrk="0" hangingPunct="1">
-                <a:lnSpc>
-                  <a:spcPct val="90000"/>
-                </a:lnSpc>
-                <a:spcBef>
-                  <a:spcPts val="500"/>
-                </a:spcBef>
-                <a:buFont typeface="Arial" panose="020B0604020202020204" pitchFamily="34" charset="0"/>
-                <a:buChar char="•"/>
-                <a:defRPr sz="1800" kern="1200">
-                  <a:solidFill>
-                    <a:schemeClr val="tx1"/>
-                  </a:solidFill>
-                  <a:latin typeface="+mn-lt"/>
-                  <a:ea typeface="+mn-ea"/>
-                  <a:cs typeface="+mn-cs"/>
-                </a:defRPr>
-              </a:lvl8pPr>
-              <a:lvl9pPr marL="3886200" indent="-228600" algn="l" defTabSz="914400" rtl="0" eaLnBrk="1" latinLnBrk="0" hangingPunct="1">
-                <a:lnSpc>
-                  <a:spcPct val="90000"/>
-                </a:lnSpc>
-                <a:spcBef>
-                  <a:spcPts val="500"/>
-                </a:spcBef>
-                <a:buFont typeface="Arial" panose="020B0604020202020204" pitchFamily="34" charset="0"/>
-                <a:buChar char="•"/>
-                <a:defRPr sz="1800" kern="1200">
-                  <a:solidFill>
-                    <a:schemeClr val="tx1"/>
-                  </a:solidFill>
-                  <a:latin typeface="+mn-lt"/>
-                  <a:ea typeface="+mn-ea"/>
-                  <a:cs typeface="+mn-cs"/>
-                </a:defRPr>
-              </a:lvl9pPr>
-            </a:lstStyle>
-            <a:p>
-              <a:pPr marL="0" indent="0" algn="ctr">
-                <a:buNone/>
-              </a:pPr>
-              <a:r>
-                <a:rPr lang="en-GB" sz="1000" dirty="0">
-                  <a:latin typeface="Bahnschrift" panose="020B0502040204020203" pitchFamily="34" charset="0"/>
-                </a:rPr>
-                <a:t>1</a:t>
-              </a:r>
-              <a:br>
-                <a:rPr lang="en-GB" sz="1000" dirty="0">
-                  <a:latin typeface="Bahnschrift" panose="020B0502040204020203" pitchFamily="34" charset="0"/>
-                </a:rPr>
-              </a:br>
-              <a:r>
-                <a:rPr lang="en-GB" sz="1000" dirty="0">
-                  <a:latin typeface="Bahnschrift" panose="020B0502040204020203" pitchFamily="34" charset="0"/>
-                </a:rPr>
-                <a:t>30</a:t>
-              </a:r>
-            </a:p>
-          </p:txBody>
-        </p:sp>
-        <p:cxnSp>
-          <p:nvCxnSpPr>
-            <p:cNvPr id="19" name="Straight Connector 18">
-              <a:extLst>
-                <a:ext uri="{FF2B5EF4-FFF2-40B4-BE49-F238E27FC236}">
-                  <a16:creationId xmlns:a16="http://schemas.microsoft.com/office/drawing/2014/main" id="{CBBFDE95-2A1C-4CDC-919D-0D38EDCAACCA}"/>
-                </a:ext>
-              </a:extLst>
-            </p:cNvPr>
-            <p:cNvCxnSpPr>
-              <a:cxnSpLocks/>
-            </p:cNvCxnSpPr>
-            <p:nvPr/>
-          </p:nvCxnSpPr>
-          <p:spPr>
-            <a:xfrm flipH="1">
-              <a:off x="4236441" y="3320991"/>
-              <a:ext cx="144000" cy="0"/>
-            </a:xfrm>
-            <a:prstGeom prst="line">
-              <a:avLst/>
-            </a:prstGeom>
-            <a:ln w="12700">
-              <a:solidFill>
-                <a:srgbClr val="3F3F3F"/>
-              </a:solidFill>
-            </a:ln>
-          </p:spPr>
-          <p:style>
-            <a:lnRef idx="1">
-              <a:schemeClr val="accent1"/>
-            </a:lnRef>
-            <a:fillRef idx="0">
-              <a:schemeClr val="accent1"/>
-            </a:fillRef>
-            <a:effectRef idx="0">
-              <a:schemeClr val="accent1"/>
-            </a:effectRef>
-            <a:fontRef idx="minor">
-              <a:schemeClr val="tx1"/>
-            </a:fontRef>
-          </p:style>
-        </p:cxnSp>
-      </p:grpSp>
       <p:sp>
         <p:nvSpPr>
           <p:cNvPr id="20" name="TextBox 19">
@@ -21778,7 +21748,7 @@
                 <a:hlinkClick r:id="rId2">
                   <a:extLst>
                     <a:ext uri="{A12FA001-AC4F-418D-AE19-62706E023703}">
-                      <ahyp:hlinkClr xmlns:ahyp="http://schemas.microsoft.com/office/drawing/2018/hyperlinkcolor" xmlns="" val="tx"/>
+                      <ahyp:hlinkClr xmlns:ahyp="http://schemas.microsoft.com/office/drawing/2018/hyperlinkcolor" val="tx"/>
                     </a:ext>
                   </a:extLst>
                 </a:hlinkClick>
@@ -21803,7 +21773,7 @@
                 <a:hlinkClick r:id="rId3">
                   <a:extLst>
                     <a:ext uri="{A12FA001-AC4F-418D-AE19-62706E023703}">
-                      <ahyp:hlinkClr xmlns:ahyp="http://schemas.microsoft.com/office/drawing/2018/hyperlinkcolor" xmlns="" val="tx"/>
+                      <ahyp:hlinkClr xmlns:ahyp="http://schemas.microsoft.com/office/drawing/2018/hyperlinkcolor" val="tx"/>
                     </a:ext>
                   </a:extLst>
                 </a:hlinkClick>
@@ -21828,7 +21798,7 @@
                 <a:hlinkClick r:id="rId4">
                   <a:extLst>
                     <a:ext uri="{A12FA001-AC4F-418D-AE19-62706E023703}">
-                      <ahyp:hlinkClr xmlns:ahyp="http://schemas.microsoft.com/office/drawing/2018/hyperlinkcolor" xmlns="" val="tx"/>
+                      <ahyp:hlinkClr xmlns:ahyp="http://schemas.microsoft.com/office/drawing/2018/hyperlinkcolor" val="tx"/>
                     </a:ext>
                   </a:extLst>
                 </a:hlinkClick>
@@ -21844,7 +21814,7 @@
                 <a:hlinkClick r:id="rId4">
                   <a:extLst>
                     <a:ext uri="{A12FA001-AC4F-418D-AE19-62706E023703}">
-                      <ahyp:hlinkClr xmlns:ahyp="http://schemas.microsoft.com/office/drawing/2018/hyperlinkcolor" xmlns="" val="tx"/>
+                      <ahyp:hlinkClr xmlns:ahyp="http://schemas.microsoft.com/office/drawing/2018/hyperlinkcolor" val="tx"/>
                     </a:ext>
                   </a:extLst>
                 </a:hlinkClick>
@@ -21874,7 +21844,7 @@
                 <a:hlinkClick r:id="rId5">
                   <a:extLst>
                     <a:ext uri="{A12FA001-AC4F-418D-AE19-62706E023703}">
-                      <ahyp:hlinkClr xmlns:ahyp="http://schemas.microsoft.com/office/drawing/2018/hyperlinkcolor" xmlns="" val="tx"/>
+                      <ahyp:hlinkClr xmlns:ahyp="http://schemas.microsoft.com/office/drawing/2018/hyperlinkcolor" val="tx"/>
                     </a:ext>
                   </a:extLst>
                 </a:hlinkClick>

</xml_diff>